<commit_message>
add something about object recovery
</commit_message>
<xml_diff>
--- a/MTSan_ywh.pptx
+++ b/MTSan_ywh.pptx
@@ -5,7 +5,7 @@
     <p:sldMasterId id="2147483648" r:id="rId1"/>
   </p:sldMasterIdLst>
   <p:notesMasterIdLst>
-    <p:notesMasterId r:id="rId26"/>
+    <p:notesMasterId r:id="rId27"/>
   </p:notesMasterIdLst>
   <p:sldIdLst>
     <p:sldId id="1824" r:id="rId2"/>
@@ -22,16 +22,17 @@
     <p:sldId id="2702" r:id="rId13"/>
     <p:sldId id="2696" r:id="rId14"/>
     <p:sldId id="1982" r:id="rId15"/>
-    <p:sldId id="2669" r:id="rId16"/>
-    <p:sldId id="2700" r:id="rId17"/>
-    <p:sldId id="2701" r:id="rId18"/>
-    <p:sldId id="1983" r:id="rId19"/>
-    <p:sldId id="2670" r:id="rId20"/>
-    <p:sldId id="1984" r:id="rId21"/>
-    <p:sldId id="2697" r:id="rId22"/>
-    <p:sldId id="2698" r:id="rId23"/>
-    <p:sldId id="2699" r:id="rId24"/>
-    <p:sldId id="1825" r:id="rId25"/>
+    <p:sldId id="2700" r:id="rId16"/>
+    <p:sldId id="2701" r:id="rId17"/>
+    <p:sldId id="2669" r:id="rId18"/>
+    <p:sldId id="2703" r:id="rId19"/>
+    <p:sldId id="1983" r:id="rId20"/>
+    <p:sldId id="2670" r:id="rId21"/>
+    <p:sldId id="1984" r:id="rId22"/>
+    <p:sldId id="2697" r:id="rId23"/>
+    <p:sldId id="2698" r:id="rId24"/>
+    <p:sldId id="2699" r:id="rId25"/>
+    <p:sldId id="1825" r:id="rId26"/>
   </p:sldIdLst>
   <p:sldSz cx="12192000" cy="6858000"/>
   <p:notesSz cx="6858000" cy="9144000"/>
@@ -909,150 +910,6 @@
           <a:bodyPr/>
           <a:lstStyle/>
           <a:p>
-            <a:pPr>
-              <a:buFont typeface="Arial" panose="020B0604020202020204" pitchFamily="34" charset="0"/>
-              <a:buChar char="•"/>
-            </a:pPr>
-            <a:r>
-              <a:rPr lang="zh-CN" altLang="en-US" dirty="0"/>
-              <a:t>我们引入了一种新的硬件辅助内存检测工具 </a:t>
-            </a:r>
-            <a:r>
-              <a:rPr lang="en-US" altLang="zh-CN" dirty="0" err="1"/>
-              <a:t>MTSan</a:t>
-            </a:r>
-            <a:r>
-              <a:rPr lang="zh-CN" altLang="en-US" dirty="0"/>
-              <a:t>，以帮助进行二进制模糊测试。</a:t>
-            </a:r>
-            <a:r>
-              <a:rPr lang="en-US" altLang="zh-CN" dirty="0" err="1"/>
-              <a:t>MTSan</a:t>
-            </a:r>
-            <a:r>
-              <a:rPr lang="en-US" altLang="zh-CN" dirty="0"/>
-              <a:t> </a:t>
-            </a:r>
-            <a:r>
-              <a:rPr lang="zh-CN" altLang="en-US" dirty="0"/>
-              <a:t>利用 </a:t>
-            </a:r>
-            <a:r>
-              <a:rPr lang="en-US" altLang="zh-CN" dirty="0"/>
-              <a:t>ARM </a:t>
-            </a:r>
-            <a:r>
-              <a:rPr lang="zh-CN" altLang="en-US" dirty="0"/>
-              <a:t>的 </a:t>
-            </a:r>
-            <a:r>
-              <a:rPr lang="en-US" altLang="zh-CN" dirty="0"/>
-              <a:t>Memory Tagging Extension (MTE)</a:t>
-            </a:r>
-            <a:r>
-              <a:rPr lang="zh-CN" altLang="en-US" dirty="0"/>
-              <a:t>，能够高效地检测时态和空间内存错误。</a:t>
-            </a:r>
-          </a:p>
-          <a:p>
-            <a:pPr>
-              <a:buFont typeface="Arial" panose="020B0604020202020204" pitchFamily="34" charset="0"/>
-              <a:buChar char="•"/>
-            </a:pPr>
-            <a:r>
-              <a:rPr lang="zh-CN" altLang="en-US" dirty="0"/>
-              <a:t>由于 </a:t>
-            </a:r>
-            <a:r>
-              <a:rPr lang="en-US" altLang="zh-CN" dirty="0"/>
-              <a:t>MTE </a:t>
-            </a:r>
-            <a:r>
-              <a:rPr lang="zh-CN" altLang="en-US" dirty="0"/>
-              <a:t>目前尚未在现成的 </a:t>
-            </a:r>
-            <a:r>
-              <a:rPr lang="en-US" altLang="zh-CN" dirty="0"/>
-              <a:t>ARM </a:t>
-            </a:r>
-            <a:r>
-              <a:rPr lang="zh-CN" altLang="en-US" dirty="0"/>
-              <a:t>处理器中普及，研究人员必须在软件中模拟 </a:t>
-            </a:r>
-            <a:r>
-              <a:rPr lang="en-US" altLang="zh-CN" dirty="0"/>
-              <a:t>MTE</a:t>
-            </a:r>
-            <a:r>
-              <a:rPr lang="zh-CN" altLang="en-US" dirty="0"/>
-              <a:t>。为简化这一过程，我们实现了一个库 </a:t>
-            </a:r>
-            <a:r>
-              <a:rPr lang="en-US" altLang="zh-CN" dirty="0" err="1"/>
-              <a:t>libMTE</a:t>
-            </a:r>
-            <a:r>
-              <a:rPr lang="zh-CN" altLang="en-US" dirty="0"/>
-              <a:t>，用于在不具备 </a:t>
-            </a:r>
-            <a:r>
-              <a:rPr lang="en-US" altLang="zh-CN" dirty="0"/>
-              <a:t>MTE </a:t>
-            </a:r>
-            <a:r>
-              <a:rPr lang="zh-CN" altLang="en-US" dirty="0"/>
-              <a:t>功能的处理器上模拟 </a:t>
-            </a:r>
-            <a:r>
-              <a:rPr lang="en-US" altLang="zh-CN" dirty="0"/>
-              <a:t>MTE </a:t>
-            </a:r>
-            <a:r>
-              <a:rPr lang="zh-CN" altLang="en-US" dirty="0"/>
-              <a:t>提供的关键特性。</a:t>
-            </a:r>
-          </a:p>
-          <a:p>
-            <a:pPr>
-              <a:buFont typeface="Arial" panose="020B0604020202020204" pitchFamily="34" charset="0"/>
-              <a:buChar char="•"/>
-            </a:pPr>
-            <a:r>
-              <a:rPr lang="zh-CN" altLang="en-US" dirty="0"/>
-              <a:t>我们实现了 </a:t>
-            </a:r>
-            <a:r>
-              <a:rPr lang="en-US" altLang="zh-CN" dirty="0" err="1"/>
-              <a:t>MTSan</a:t>
-            </a:r>
-            <a:r>
-              <a:rPr lang="en-US" altLang="zh-CN" dirty="0"/>
-              <a:t> </a:t>
-            </a:r>
-            <a:r>
-              <a:rPr lang="zh-CN" altLang="en-US" dirty="0"/>
-              <a:t>的原型，并系统地评估了其在安全性、运行时和内存开销以及模糊测试有效性方面的表现。结果显示，</a:t>
-            </a:r>
-            <a:r>
-              <a:rPr lang="en-US" altLang="zh-CN" dirty="0" err="1"/>
-              <a:t>MTSan</a:t>
-            </a:r>
-            <a:r>
-              <a:rPr lang="en-US" altLang="zh-CN" dirty="0"/>
-              <a:t> </a:t>
-            </a:r>
-            <a:r>
-              <a:rPr lang="zh-CN" altLang="en-US" dirty="0"/>
-              <a:t>的性能优于当前最先进的二进制检测工具。</a:t>
-            </a:r>
-          </a:p>
-          <a:p>
-            <a:r>
-              <a:rPr lang="en-US" altLang="zh-CN" dirty="0"/>
-              <a:t>4o</a:t>
-            </a:r>
-          </a:p>
-          <a:p>
             <a:endParaRPr lang="zh-CN" altLang="en-US" dirty="0"/>
           </a:p>
         </p:txBody>
@@ -1238,7 +1095,18 @@
           <a:bodyPr/>
           <a:lstStyle/>
           <a:p>
-            <a:endParaRPr lang="zh-CN" altLang="en-US"/>
+            <a:r>
+              <a:rPr lang="zh-CN" altLang="en-US" dirty="0"/>
+              <a:t>以往的方法不支持对栈对象和全局对象的分析的原因在于，源代码经过编译，原本关于栈对象和全局对象的信息会丢失，也就是说在栈空间和全局变量区域，对象的属性是未知的。</a:t>
+            </a:r>
+            <a:endParaRPr lang="en-US" altLang="zh-CN" dirty="0"/>
+          </a:p>
+          <a:p>
+            <a:r>
+              <a:rPr lang="zh-CN" altLang="en-US" dirty="0"/>
+              <a:t>所以为了对支持栈和全局对象的分析，而引入了一种新的机制，叫做渐进式对象恢复。渐进式对象恢复的目标就是通过程序的行为，分析出对象的属性。</a:t>
+            </a:r>
+            <a:endParaRPr lang="en-US" altLang="zh-CN" dirty="0"/>
           </a:p>
         </p:txBody>
       </p:sp>
@@ -1274,7 +1142,7 @@
     </p:spTree>
     <p:extLst>
       <p:ext uri="{BB962C8B-B14F-4D97-AF65-F5344CB8AC3E}">
-        <p14:creationId xmlns:p14="http://schemas.microsoft.com/office/powerpoint/2010/main" val="2584489241"/>
+        <p14:creationId xmlns:p14="http://schemas.microsoft.com/office/powerpoint/2010/main" val="1316717273"/>
       </p:ext>
     </p:extLst>
   </p:cSld>
@@ -1364,7 +1232,7 @@
     </p:spTree>
     <p:extLst>
       <p:ext uri="{BB962C8B-B14F-4D97-AF65-F5344CB8AC3E}">
-        <p14:creationId xmlns:p14="http://schemas.microsoft.com/office/powerpoint/2010/main" val="1316717273"/>
+        <p14:creationId xmlns:p14="http://schemas.microsoft.com/office/powerpoint/2010/main" val="2628288756"/>
       </p:ext>
     </p:extLst>
   </p:cSld>
@@ -1454,7 +1322,7 @@
     </p:spTree>
     <p:extLst>
       <p:ext uri="{BB962C8B-B14F-4D97-AF65-F5344CB8AC3E}">
-        <p14:creationId xmlns:p14="http://schemas.microsoft.com/office/powerpoint/2010/main" val="2628288756"/>
+        <p14:creationId xmlns:p14="http://schemas.microsoft.com/office/powerpoint/2010/main" val="2584489241"/>
       </p:ext>
     </p:extLst>
   </p:cSld>
@@ -1465,6 +1333,96 @@
 </file>
 
 <file path=ppt/notesSlides/notesSlide18.xml><?xml version="1.0" encoding="utf-8"?>
+<p:notes xmlns:a="http://schemas.openxmlformats.org/drawingml/2006/main" xmlns:r="http://schemas.openxmlformats.org/officeDocument/2006/relationships" xmlns:p="http://schemas.openxmlformats.org/presentationml/2006/main">
+  <p:cSld>
+    <p:spTree>
+      <p:nvGrpSpPr>
+        <p:cNvPr id="1" name=""/>
+        <p:cNvGrpSpPr/>
+        <p:nvPr/>
+      </p:nvGrpSpPr>
+      <p:grpSpPr>
+        <a:xfrm>
+          <a:off x="0" y="0"/>
+          <a:ext cx="0" cy="0"/>
+          <a:chOff x="0" y="0"/>
+          <a:chExt cx="0" cy="0"/>
+        </a:xfrm>
+      </p:grpSpPr>
+      <p:sp>
+        <p:nvSpPr>
+          <p:cNvPr id="2" name="幻灯片图像占位符 1"/>
+          <p:cNvSpPr>
+            <a:spLocks noGrp="1" noRot="1" noChangeAspect="1"/>
+          </p:cNvSpPr>
+          <p:nvPr>
+            <p:ph type="sldImg"/>
+          </p:nvPr>
+        </p:nvSpPr>
+        <p:spPr/>
+      </p:sp>
+      <p:sp>
+        <p:nvSpPr>
+          <p:cNvPr id="3" name="备注占位符 2"/>
+          <p:cNvSpPr>
+            <a:spLocks noGrp="1"/>
+          </p:cNvSpPr>
+          <p:nvPr>
+            <p:ph type="body" idx="1"/>
+          </p:nvPr>
+        </p:nvSpPr>
+        <p:spPr/>
+        <p:txBody>
+          <a:bodyPr/>
+          <a:lstStyle/>
+          <a:p>
+            <a:endParaRPr lang="zh-CN" altLang="en-US"/>
+          </a:p>
+        </p:txBody>
+      </p:sp>
+      <p:sp>
+        <p:nvSpPr>
+          <p:cNvPr id="4" name="灯片编号占位符 3"/>
+          <p:cNvSpPr>
+            <a:spLocks noGrp="1"/>
+          </p:cNvSpPr>
+          <p:nvPr>
+            <p:ph type="sldNum" sz="quarter" idx="10"/>
+          </p:nvPr>
+        </p:nvSpPr>
+        <p:spPr/>
+        <p:txBody>
+          <a:bodyPr/>
+          <a:lstStyle/>
+          <a:p>
+            <a:pPr>
+              <a:defRPr/>
+            </a:pPr>
+            <a:fld id="{CD7A2CCA-E5D5-4859-8035-B358016F08F8}" type="slidenum">
+              <a:rPr lang="zh-CN" altLang="en-US" smtClean="0"/>
+              <a:pPr>
+                <a:defRPr/>
+              </a:pPr>
+              <a:t>18</a:t>
+            </a:fld>
+            <a:endParaRPr lang="zh-CN" altLang="en-US" dirty="0"/>
+          </a:p>
+        </p:txBody>
+      </p:sp>
+    </p:spTree>
+    <p:extLst>
+      <p:ext uri="{BB962C8B-B14F-4D97-AF65-F5344CB8AC3E}">
+        <p14:creationId xmlns:p14="http://schemas.microsoft.com/office/powerpoint/2010/main" val="184955416"/>
+      </p:ext>
+    </p:extLst>
+  </p:cSld>
+  <p:clrMapOvr>
+    <a:masterClrMapping/>
+  </p:clrMapOvr>
+</p:notes>
+</file>
+
+<file path=ppt/notesSlides/notesSlide19.xml><?xml version="1.0" encoding="utf-8"?>
 <p:notes xmlns:a="http://schemas.openxmlformats.org/drawingml/2006/main" xmlns:r="http://schemas.openxmlformats.org/officeDocument/2006/relationships" xmlns:p="http://schemas.openxmlformats.org/presentationml/2006/main">
   <p:cSld>
     <p:spTree>
@@ -1540,7 +1498,7 @@
               <a:pPr>
                 <a:defRPr/>
               </a:pPr>
-              <a:t>18</a:t>
+              <a:t>19</a:t>
             </a:fld>
             <a:endParaRPr lang="zh-CN" altLang="en-US" dirty="0"/>
           </a:p>
@@ -1550,96 +1508,6 @@
     <p:extLst>
       <p:ext uri="{BB962C8B-B14F-4D97-AF65-F5344CB8AC3E}">
         <p14:creationId xmlns:p14="http://schemas.microsoft.com/office/powerpoint/2010/main" val="2123578710"/>
-      </p:ext>
-    </p:extLst>
-  </p:cSld>
-  <p:clrMapOvr>
-    <a:masterClrMapping/>
-  </p:clrMapOvr>
-</p:notes>
-</file>
-
-<file path=ppt/notesSlides/notesSlide19.xml><?xml version="1.0" encoding="utf-8"?>
-<p:notes xmlns:a="http://schemas.openxmlformats.org/drawingml/2006/main" xmlns:r="http://schemas.openxmlformats.org/officeDocument/2006/relationships" xmlns:p="http://schemas.openxmlformats.org/presentationml/2006/main">
-  <p:cSld>
-    <p:spTree>
-      <p:nvGrpSpPr>
-        <p:cNvPr id="1" name=""/>
-        <p:cNvGrpSpPr/>
-        <p:nvPr/>
-      </p:nvGrpSpPr>
-      <p:grpSpPr>
-        <a:xfrm>
-          <a:off x="0" y="0"/>
-          <a:ext cx="0" cy="0"/>
-          <a:chOff x="0" y="0"/>
-          <a:chExt cx="0" cy="0"/>
-        </a:xfrm>
-      </p:grpSpPr>
-      <p:sp>
-        <p:nvSpPr>
-          <p:cNvPr id="2" name="幻灯片图像占位符 1"/>
-          <p:cNvSpPr>
-            <a:spLocks noGrp="1" noRot="1" noChangeAspect="1"/>
-          </p:cNvSpPr>
-          <p:nvPr>
-            <p:ph type="sldImg"/>
-          </p:nvPr>
-        </p:nvSpPr>
-        <p:spPr/>
-      </p:sp>
-      <p:sp>
-        <p:nvSpPr>
-          <p:cNvPr id="3" name="备注占位符 2"/>
-          <p:cNvSpPr>
-            <a:spLocks noGrp="1"/>
-          </p:cNvSpPr>
-          <p:nvPr>
-            <p:ph type="body" idx="1"/>
-          </p:nvPr>
-        </p:nvSpPr>
-        <p:spPr/>
-        <p:txBody>
-          <a:bodyPr/>
-          <a:lstStyle/>
-          <a:p>
-            <a:endParaRPr lang="zh-CN" altLang="en-US"/>
-          </a:p>
-        </p:txBody>
-      </p:sp>
-      <p:sp>
-        <p:nvSpPr>
-          <p:cNvPr id="4" name="灯片编号占位符 3"/>
-          <p:cNvSpPr>
-            <a:spLocks noGrp="1"/>
-          </p:cNvSpPr>
-          <p:nvPr>
-            <p:ph type="sldNum" sz="quarter" idx="10"/>
-          </p:nvPr>
-        </p:nvSpPr>
-        <p:spPr/>
-        <p:txBody>
-          <a:bodyPr/>
-          <a:lstStyle/>
-          <a:p>
-            <a:pPr>
-              <a:defRPr/>
-            </a:pPr>
-            <a:fld id="{CD7A2CCA-E5D5-4859-8035-B358016F08F8}" type="slidenum">
-              <a:rPr lang="zh-CN" altLang="en-US" smtClean="0"/>
-              <a:pPr>
-                <a:defRPr/>
-              </a:pPr>
-              <a:t>19</a:t>
-            </a:fld>
-            <a:endParaRPr lang="zh-CN" altLang="en-US" dirty="0"/>
-          </a:p>
-        </p:txBody>
-      </p:sp>
-    </p:spTree>
-    <p:extLst>
-      <p:ext uri="{BB962C8B-B14F-4D97-AF65-F5344CB8AC3E}">
-        <p14:creationId xmlns:p14="http://schemas.microsoft.com/office/powerpoint/2010/main" val="3844243761"/>
       </p:ext>
     </p:extLst>
   </p:cSld>
@@ -1766,12 +1634,7 @@
             <p:ph type="sldImg"/>
           </p:nvPr>
         </p:nvSpPr>
-        <p:spPr>
-          <a:xfrm>
-            <a:off x="685800" y="1143000"/>
-            <a:ext cx="5486400" cy="3086100"/>
-          </a:xfrm>
-        </p:spPr>
+        <p:spPr/>
       </p:sp>
       <p:sp>
         <p:nvSpPr>
@@ -1824,7 +1687,7 @@
     </p:spTree>
     <p:extLst>
       <p:ext uri="{BB962C8B-B14F-4D97-AF65-F5344CB8AC3E}">
-        <p14:creationId xmlns:p14="http://schemas.microsoft.com/office/powerpoint/2010/main" val="1071875887"/>
+        <p14:creationId xmlns:p14="http://schemas.microsoft.com/office/powerpoint/2010/main" val="3844243761"/>
       </p:ext>
     </p:extLst>
   </p:cSld>
@@ -1861,7 +1724,12 @@
             <p:ph type="sldImg"/>
           </p:nvPr>
         </p:nvSpPr>
-        <p:spPr/>
+        <p:spPr>
+          <a:xfrm>
+            <a:off x="685800" y="1143000"/>
+            <a:ext cx="5486400" cy="3086100"/>
+          </a:xfrm>
+        </p:spPr>
       </p:sp>
       <p:sp>
         <p:nvSpPr>
@@ -1914,7 +1782,7 @@
     </p:spTree>
     <p:extLst>
       <p:ext uri="{BB962C8B-B14F-4D97-AF65-F5344CB8AC3E}">
-        <p14:creationId xmlns:p14="http://schemas.microsoft.com/office/powerpoint/2010/main" val="1819013465"/>
+        <p14:creationId xmlns:p14="http://schemas.microsoft.com/office/powerpoint/2010/main" val="1071875887"/>
       </p:ext>
     </p:extLst>
   </p:cSld>
@@ -2004,7 +1872,7 @@
     </p:spTree>
     <p:extLst>
       <p:ext uri="{BB962C8B-B14F-4D97-AF65-F5344CB8AC3E}">
-        <p14:creationId xmlns:p14="http://schemas.microsoft.com/office/powerpoint/2010/main" val="2872485453"/>
+        <p14:creationId xmlns:p14="http://schemas.microsoft.com/office/powerpoint/2010/main" val="1819013465"/>
       </p:ext>
     </p:extLst>
   </p:cSld>
@@ -2094,6 +1962,96 @@
     </p:spTree>
     <p:extLst>
       <p:ext uri="{BB962C8B-B14F-4D97-AF65-F5344CB8AC3E}">
+        <p14:creationId xmlns:p14="http://schemas.microsoft.com/office/powerpoint/2010/main" val="2872485453"/>
+      </p:ext>
+    </p:extLst>
+  </p:cSld>
+  <p:clrMapOvr>
+    <a:masterClrMapping/>
+  </p:clrMapOvr>
+</p:notes>
+</file>
+
+<file path=ppt/notesSlides/notesSlide24.xml><?xml version="1.0" encoding="utf-8"?>
+<p:notes xmlns:a="http://schemas.openxmlformats.org/drawingml/2006/main" xmlns:r="http://schemas.openxmlformats.org/officeDocument/2006/relationships" xmlns:p="http://schemas.openxmlformats.org/presentationml/2006/main">
+  <p:cSld>
+    <p:spTree>
+      <p:nvGrpSpPr>
+        <p:cNvPr id="1" name=""/>
+        <p:cNvGrpSpPr/>
+        <p:nvPr/>
+      </p:nvGrpSpPr>
+      <p:grpSpPr>
+        <a:xfrm>
+          <a:off x="0" y="0"/>
+          <a:ext cx="0" cy="0"/>
+          <a:chOff x="0" y="0"/>
+          <a:chExt cx="0" cy="0"/>
+        </a:xfrm>
+      </p:grpSpPr>
+      <p:sp>
+        <p:nvSpPr>
+          <p:cNvPr id="2" name="幻灯片图像占位符 1"/>
+          <p:cNvSpPr>
+            <a:spLocks noGrp="1" noRot="1" noChangeAspect="1"/>
+          </p:cNvSpPr>
+          <p:nvPr>
+            <p:ph type="sldImg"/>
+          </p:nvPr>
+        </p:nvSpPr>
+        <p:spPr/>
+      </p:sp>
+      <p:sp>
+        <p:nvSpPr>
+          <p:cNvPr id="3" name="备注占位符 2"/>
+          <p:cNvSpPr>
+            <a:spLocks noGrp="1"/>
+          </p:cNvSpPr>
+          <p:nvPr>
+            <p:ph type="body" idx="1"/>
+          </p:nvPr>
+        </p:nvSpPr>
+        <p:spPr/>
+        <p:txBody>
+          <a:bodyPr/>
+          <a:lstStyle/>
+          <a:p>
+            <a:endParaRPr lang="zh-CN" altLang="en-US"/>
+          </a:p>
+        </p:txBody>
+      </p:sp>
+      <p:sp>
+        <p:nvSpPr>
+          <p:cNvPr id="4" name="灯片编号占位符 3"/>
+          <p:cNvSpPr>
+            <a:spLocks noGrp="1"/>
+          </p:cNvSpPr>
+          <p:nvPr>
+            <p:ph type="sldNum" sz="quarter" idx="10"/>
+          </p:nvPr>
+        </p:nvSpPr>
+        <p:spPr/>
+        <p:txBody>
+          <a:bodyPr/>
+          <a:lstStyle/>
+          <a:p>
+            <a:pPr>
+              <a:defRPr/>
+            </a:pPr>
+            <a:fld id="{CD7A2CCA-E5D5-4859-8035-B358016F08F8}" type="slidenum">
+              <a:rPr lang="zh-CN" altLang="en-US" smtClean="0"/>
+              <a:pPr>
+                <a:defRPr/>
+              </a:pPr>
+              <a:t>24</a:t>
+            </a:fld>
+            <a:endParaRPr lang="zh-CN" altLang="en-US" dirty="0"/>
+          </a:p>
+        </p:txBody>
+      </p:sp>
+    </p:spTree>
+    <p:extLst>
+      <p:ext uri="{BB962C8B-B14F-4D97-AF65-F5344CB8AC3E}">
         <p14:creationId xmlns:p14="http://schemas.microsoft.com/office/powerpoint/2010/main" val="2977062814"/>
       </p:ext>
     </p:extLst>
@@ -2104,7 +2062,7 @@
 </p:notes>
 </file>
 
-<file path=ppt/notesSlides/notesSlide24.xml><?xml version="1.0" encoding="utf-8"?>
+<file path=ppt/notesSlides/notesSlide25.xml><?xml version="1.0" encoding="utf-8"?>
 <p:notes xmlns:a="http://schemas.openxmlformats.org/drawingml/2006/main" xmlns:r="http://schemas.openxmlformats.org/officeDocument/2006/relationships" xmlns:p="http://schemas.openxmlformats.org/presentationml/2006/main">
   <p:cSld>
     <p:spTree>
@@ -2180,7 +2138,7 @@
               <a:pPr>
                 <a:defRPr/>
               </a:pPr>
-              <a:t>24</a:t>
+              <a:t>25</a:t>
             </a:fld>
             <a:endParaRPr lang="zh-CN" altLang="en-US" dirty="0"/>
           </a:p>
@@ -30024,91 +29982,6 @@
             <p:ph type="title"/>
           </p:nvPr>
         </p:nvSpPr>
-        <p:spPr/>
-        <p:txBody>
-          <a:bodyPr/>
-          <a:lstStyle/>
-          <a:p>
-            <a:r>
-              <a:rPr lang="zh-CN" altLang="en-US" dirty="0"/>
-              <a:t>整体流程</a:t>
-            </a:r>
-          </a:p>
-        </p:txBody>
-      </p:sp>
-      <p:pic>
-        <p:nvPicPr>
-          <p:cNvPr id="3" name="图片 2">
-            <a:extLst>
-              <a:ext uri="{FF2B5EF4-FFF2-40B4-BE49-F238E27FC236}">
-                <a16:creationId xmlns:a16="http://schemas.microsoft.com/office/drawing/2014/main" id="{54E7D586-F3C8-445C-96E7-9E5FD327E014}"/>
-              </a:ext>
-            </a:extLst>
-          </p:cNvPr>
-          <p:cNvPicPr>
-            <a:picLocks noChangeAspect="1"/>
-          </p:cNvPicPr>
-          <p:nvPr/>
-        </p:nvPicPr>
-        <p:blipFill>
-          <a:blip r:embed="rId3"/>
-          <a:stretch>
-            <a:fillRect/>
-          </a:stretch>
-        </p:blipFill>
-        <p:spPr>
-          <a:xfrm>
-            <a:off x="682625" y="1020437"/>
-            <a:ext cx="6987138" cy="5217176"/>
-          </a:xfrm>
-          <a:prstGeom prst="rect">
-            <a:avLst/>
-          </a:prstGeom>
-        </p:spPr>
-      </p:pic>
-    </p:spTree>
-    <p:extLst>
-      <p:ext uri="{BB962C8B-B14F-4D97-AF65-F5344CB8AC3E}">
-        <p14:creationId xmlns:p14="http://schemas.microsoft.com/office/powerpoint/2010/main" val="2052522111"/>
-      </p:ext>
-    </p:extLst>
-  </p:cSld>
-  <p:clrMapOvr>
-    <a:masterClrMapping/>
-  </p:clrMapOvr>
-  <p:transition spd="med">
-    <p:pull/>
-  </p:transition>
-</p:sld>
-</file>
-
-<file path=ppt/slides/slide16.xml><?xml version="1.0" encoding="utf-8"?>
-<p:sld xmlns:a="http://schemas.openxmlformats.org/drawingml/2006/main" xmlns:r="http://schemas.openxmlformats.org/officeDocument/2006/relationships" xmlns:p="http://schemas.openxmlformats.org/presentationml/2006/main">
-  <p:cSld>
-    <p:spTree>
-      <p:nvGrpSpPr>
-        <p:cNvPr id="1" name=""/>
-        <p:cNvGrpSpPr/>
-        <p:nvPr/>
-      </p:nvGrpSpPr>
-      <p:grpSpPr>
-        <a:xfrm>
-          <a:off x="0" y="0"/>
-          <a:ext cx="0" cy="0"/>
-          <a:chOff x="0" y="0"/>
-          <a:chExt cx="0" cy="0"/>
-        </a:xfrm>
-      </p:grpSpPr>
-      <p:sp>
-        <p:nvSpPr>
-          <p:cNvPr id="9" name="标题 8"/>
-          <p:cNvSpPr>
-            <a:spLocks noGrp="1"/>
-          </p:cNvSpPr>
-          <p:nvPr>
-            <p:ph type="title"/>
-          </p:nvPr>
-        </p:nvSpPr>
         <p:spPr>
           <a:xfrm>
             <a:off x="577850" y="249067"/>
@@ -30142,7 +30015,7 @@
 </p:sld>
 </file>
 
-<file path=ppt/slides/slide17.xml><?xml version="1.0" encoding="utf-8"?>
+<file path=ppt/slides/slide16.xml><?xml version="1.0" encoding="utf-8"?>
 <p:sld xmlns:a="http://schemas.openxmlformats.org/drawingml/2006/main" xmlns:r="http://schemas.openxmlformats.org/officeDocument/2006/relationships" xmlns:p="http://schemas.openxmlformats.org/presentationml/2006/main">
   <p:cSld>
     <p:spTree>
@@ -30205,7 +30078,151 @@
 </p:sld>
 </file>
 
+<file path=ppt/slides/slide17.xml><?xml version="1.0" encoding="utf-8"?>
+<p:sld xmlns:a="http://schemas.openxmlformats.org/drawingml/2006/main" xmlns:r="http://schemas.openxmlformats.org/officeDocument/2006/relationships" xmlns:p="http://schemas.openxmlformats.org/presentationml/2006/main">
+  <p:cSld>
+    <p:spTree>
+      <p:nvGrpSpPr>
+        <p:cNvPr id="1" name=""/>
+        <p:cNvGrpSpPr/>
+        <p:nvPr/>
+      </p:nvGrpSpPr>
+      <p:grpSpPr>
+        <a:xfrm>
+          <a:off x="0" y="0"/>
+          <a:ext cx="0" cy="0"/>
+          <a:chOff x="0" y="0"/>
+          <a:chExt cx="0" cy="0"/>
+        </a:xfrm>
+      </p:grpSpPr>
+      <p:sp>
+        <p:nvSpPr>
+          <p:cNvPr id="9" name="标题 8"/>
+          <p:cNvSpPr>
+            <a:spLocks noGrp="1"/>
+          </p:cNvSpPr>
+          <p:nvPr>
+            <p:ph type="title"/>
+          </p:nvPr>
+        </p:nvSpPr>
+        <p:spPr/>
+        <p:txBody>
+          <a:bodyPr/>
+          <a:lstStyle/>
+          <a:p>
+            <a:r>
+              <a:rPr lang="zh-CN" altLang="en-US" dirty="0"/>
+              <a:t>整体流程</a:t>
+            </a:r>
+          </a:p>
+        </p:txBody>
+      </p:sp>
+      <p:pic>
+        <p:nvPicPr>
+          <p:cNvPr id="3" name="图片 2">
+            <a:extLst>
+              <a:ext uri="{FF2B5EF4-FFF2-40B4-BE49-F238E27FC236}">
+                <a16:creationId xmlns:a16="http://schemas.microsoft.com/office/drawing/2014/main" id="{54E7D586-F3C8-445C-96E7-9E5FD327E014}"/>
+              </a:ext>
+            </a:extLst>
+          </p:cNvPr>
+          <p:cNvPicPr>
+            <a:picLocks noChangeAspect="1"/>
+          </p:cNvPicPr>
+          <p:nvPr/>
+        </p:nvPicPr>
+        <p:blipFill>
+          <a:blip r:embed="rId3"/>
+          <a:stretch>
+            <a:fillRect/>
+          </a:stretch>
+        </p:blipFill>
+        <p:spPr>
+          <a:xfrm>
+            <a:off x="682625" y="1020437"/>
+            <a:ext cx="6987138" cy="5217176"/>
+          </a:xfrm>
+          <a:prstGeom prst="rect">
+            <a:avLst/>
+          </a:prstGeom>
+        </p:spPr>
+      </p:pic>
+    </p:spTree>
+    <p:extLst>
+      <p:ext uri="{BB962C8B-B14F-4D97-AF65-F5344CB8AC3E}">
+        <p14:creationId xmlns:p14="http://schemas.microsoft.com/office/powerpoint/2010/main" val="2052522111"/>
+      </p:ext>
+    </p:extLst>
+  </p:cSld>
+  <p:clrMapOvr>
+    <a:masterClrMapping/>
+  </p:clrMapOvr>
+  <p:transition spd="med">
+    <p:pull/>
+  </p:transition>
+</p:sld>
+</file>
+
 <file path=ppt/slides/slide18.xml><?xml version="1.0" encoding="utf-8"?>
+<p:sld xmlns:a="http://schemas.openxmlformats.org/drawingml/2006/main" xmlns:r="http://schemas.openxmlformats.org/officeDocument/2006/relationships" xmlns:p="http://schemas.openxmlformats.org/presentationml/2006/main">
+  <p:cSld>
+    <p:spTree>
+      <p:nvGrpSpPr>
+        <p:cNvPr id="1" name=""/>
+        <p:cNvGrpSpPr/>
+        <p:nvPr/>
+      </p:nvGrpSpPr>
+      <p:grpSpPr>
+        <a:xfrm>
+          <a:off x="0" y="0"/>
+          <a:ext cx="0" cy="0"/>
+          <a:chOff x="0" y="0"/>
+          <a:chExt cx="0" cy="0"/>
+        </a:xfrm>
+      </p:grpSpPr>
+      <p:sp>
+        <p:nvSpPr>
+          <p:cNvPr id="9" name="标题 8"/>
+          <p:cNvSpPr>
+            <a:spLocks noGrp="1"/>
+          </p:cNvSpPr>
+          <p:nvPr>
+            <p:ph type="title"/>
+          </p:nvPr>
+        </p:nvSpPr>
+        <p:spPr/>
+        <p:txBody>
+          <a:bodyPr/>
+          <a:lstStyle/>
+          <a:p>
+            <a:r>
+              <a:rPr lang="en-US" altLang="zh-CN" dirty="0"/>
+              <a:t>MTE</a:t>
+            </a:r>
+            <a:r>
+              <a:rPr lang="zh-CN" altLang="en-US" dirty="0"/>
+              <a:t>技术</a:t>
+            </a:r>
+          </a:p>
+        </p:txBody>
+      </p:sp>
+    </p:spTree>
+    <p:extLst>
+      <p:ext uri="{BB962C8B-B14F-4D97-AF65-F5344CB8AC3E}">
+        <p14:creationId xmlns:p14="http://schemas.microsoft.com/office/powerpoint/2010/main" val="80690138"/>
+      </p:ext>
+    </p:extLst>
+  </p:cSld>
+  <p:clrMapOvr>
+    <a:masterClrMapping/>
+  </p:clrMapOvr>
+  <p:transition spd="med">
+    <p:pull/>
+  </p:transition>
+</p:sld>
+</file>
+
+<file path=ppt/slides/slide19.xml><?xml version="1.0" encoding="utf-8"?>
 <p:sld xmlns:a="http://schemas.openxmlformats.org/drawingml/2006/main" xmlns:r="http://schemas.openxmlformats.org/officeDocument/2006/relationships" xmlns:p="http://schemas.openxmlformats.org/presentationml/2006/main">
   <p:cSld>
     <p:spTree>
@@ -32574,61 +32591,6 @@
 </p:sld>
 </file>
 
-<file path=ppt/slides/slide19.xml><?xml version="1.0" encoding="utf-8"?>
-<p:sld xmlns:a="http://schemas.openxmlformats.org/drawingml/2006/main" xmlns:r="http://schemas.openxmlformats.org/officeDocument/2006/relationships" xmlns:p="http://schemas.openxmlformats.org/presentationml/2006/main">
-  <p:cSld>
-    <p:spTree>
-      <p:nvGrpSpPr>
-        <p:cNvPr id="1" name=""/>
-        <p:cNvGrpSpPr/>
-        <p:nvPr/>
-      </p:nvGrpSpPr>
-      <p:grpSpPr>
-        <a:xfrm>
-          <a:off x="0" y="0"/>
-          <a:ext cx="0" cy="0"/>
-          <a:chOff x="0" y="0"/>
-          <a:chExt cx="0" cy="0"/>
-        </a:xfrm>
-      </p:grpSpPr>
-      <p:sp>
-        <p:nvSpPr>
-          <p:cNvPr id="9" name="标题 8"/>
-          <p:cNvSpPr>
-            <a:spLocks noGrp="1"/>
-          </p:cNvSpPr>
-          <p:nvPr>
-            <p:ph type="title"/>
-          </p:nvPr>
-        </p:nvSpPr>
-        <p:spPr/>
-        <p:txBody>
-          <a:bodyPr/>
-          <a:lstStyle/>
-          <a:p>
-            <a:r>
-              <a:rPr lang="zh-CN" altLang="en-US" dirty="0"/>
-              <a:t>一段文字</a:t>
-            </a:r>
-          </a:p>
-        </p:txBody>
-      </p:sp>
-    </p:spTree>
-    <p:extLst>
-      <p:ext uri="{BB962C8B-B14F-4D97-AF65-F5344CB8AC3E}">
-        <p14:creationId xmlns:p14="http://schemas.microsoft.com/office/powerpoint/2010/main" val="1996860018"/>
-      </p:ext>
-    </p:extLst>
-  </p:cSld>
-  <p:clrMapOvr>
-    <a:masterClrMapping/>
-  </p:clrMapOvr>
-  <p:transition spd="med">
-    <p:pull/>
-  </p:transition>
-</p:sld>
-</file>
-
 <file path=ppt/slides/slide2.xml><?xml version="1.0" encoding="utf-8"?>
 <p:sld xmlns:a="http://schemas.openxmlformats.org/drawingml/2006/main" xmlns:r="http://schemas.openxmlformats.org/officeDocument/2006/relationships" xmlns:p="http://schemas.openxmlformats.org/presentationml/2006/main">
   <p:cSld>
@@ -32685,6 +32647,61 @@
 </file>
 
 <file path=ppt/slides/slide20.xml><?xml version="1.0" encoding="utf-8"?>
+<p:sld xmlns:a="http://schemas.openxmlformats.org/drawingml/2006/main" xmlns:r="http://schemas.openxmlformats.org/officeDocument/2006/relationships" xmlns:p="http://schemas.openxmlformats.org/presentationml/2006/main">
+  <p:cSld>
+    <p:spTree>
+      <p:nvGrpSpPr>
+        <p:cNvPr id="1" name=""/>
+        <p:cNvGrpSpPr/>
+        <p:nvPr/>
+      </p:nvGrpSpPr>
+      <p:grpSpPr>
+        <a:xfrm>
+          <a:off x="0" y="0"/>
+          <a:ext cx="0" cy="0"/>
+          <a:chOff x="0" y="0"/>
+          <a:chExt cx="0" cy="0"/>
+        </a:xfrm>
+      </p:grpSpPr>
+      <p:sp>
+        <p:nvSpPr>
+          <p:cNvPr id="9" name="标题 8"/>
+          <p:cNvSpPr>
+            <a:spLocks noGrp="1"/>
+          </p:cNvSpPr>
+          <p:nvPr>
+            <p:ph type="title"/>
+          </p:nvPr>
+        </p:nvSpPr>
+        <p:spPr/>
+        <p:txBody>
+          <a:bodyPr/>
+          <a:lstStyle/>
+          <a:p>
+            <a:r>
+              <a:rPr lang="zh-CN" altLang="en-US" dirty="0"/>
+              <a:t>一段文字</a:t>
+            </a:r>
+          </a:p>
+        </p:txBody>
+      </p:sp>
+    </p:spTree>
+    <p:extLst>
+      <p:ext uri="{BB962C8B-B14F-4D97-AF65-F5344CB8AC3E}">
+        <p14:creationId xmlns:p14="http://schemas.microsoft.com/office/powerpoint/2010/main" val="1996860018"/>
+      </p:ext>
+    </p:extLst>
+  </p:cSld>
+  <p:clrMapOvr>
+    <a:masterClrMapping/>
+  </p:clrMapOvr>
+  <p:transition spd="med">
+    <p:pull/>
+  </p:transition>
+</p:sld>
+</file>
+
+<file path=ppt/slides/slide21.xml><?xml version="1.0" encoding="utf-8"?>
 <p:sld xmlns:a="http://schemas.openxmlformats.org/drawingml/2006/main" xmlns:r="http://schemas.openxmlformats.org/officeDocument/2006/relationships" xmlns:p="http://schemas.openxmlformats.org/presentationml/2006/main">
   <p:cSld>
     <p:spTree>
@@ -34552,7 +34569,7 @@
 </p:sld>
 </file>
 
-<file path=ppt/slides/slide21.xml><?xml version="1.0" encoding="utf-8"?>
+<file path=ppt/slides/slide22.xml><?xml version="1.0" encoding="utf-8"?>
 <p:sld xmlns:a="http://schemas.openxmlformats.org/drawingml/2006/main" xmlns:r="http://schemas.openxmlformats.org/officeDocument/2006/relationships" xmlns:p="http://schemas.openxmlformats.org/presentationml/2006/main">
   <p:cSld>
     <p:spTree>
@@ -34611,7 +34628,7 @@
 </p:sld>
 </file>
 
-<file path=ppt/slides/slide22.xml><?xml version="1.0" encoding="utf-8"?>
+<file path=ppt/slides/slide23.xml><?xml version="1.0" encoding="utf-8"?>
 <p:sld xmlns:a="http://schemas.openxmlformats.org/drawingml/2006/main" xmlns:r="http://schemas.openxmlformats.org/officeDocument/2006/relationships" xmlns:p="http://schemas.openxmlformats.org/presentationml/2006/main">
   <p:cSld>
     <p:spTree>
@@ -34670,7 +34687,7 @@
 </p:sld>
 </file>
 
-<file path=ppt/slides/slide23.xml><?xml version="1.0" encoding="utf-8"?>
+<file path=ppt/slides/slide24.xml><?xml version="1.0" encoding="utf-8"?>
 <p:sld xmlns:a="http://schemas.openxmlformats.org/drawingml/2006/main" xmlns:r="http://schemas.openxmlformats.org/officeDocument/2006/relationships" xmlns:p="http://schemas.openxmlformats.org/presentationml/2006/main">
   <p:cSld>
     <p:spTree>
@@ -34729,7 +34746,7 @@
 </p:sld>
 </file>
 
-<file path=ppt/slides/slide24.xml><?xml version="1.0" encoding="utf-8"?>
+<file path=ppt/slides/slide25.xml><?xml version="1.0" encoding="utf-8"?>
 <p:sld xmlns:a="http://schemas.openxmlformats.org/drawingml/2006/main" xmlns:r="http://schemas.openxmlformats.org/officeDocument/2006/relationships" xmlns:p="http://schemas.openxmlformats.org/presentationml/2006/main">
   <p:cSld>
     <p:spTree>

</xml_diff>

<commit_message>
add a foo on angr
</commit_message>
<xml_diff>
--- a/MTSan_ywh.pptx
+++ b/MTSan_ywh.pptx
@@ -5,7 +5,7 @@
     <p:sldMasterId id="2147483648" r:id="rId1"/>
   </p:sldMasterIdLst>
   <p:notesMasterIdLst>
-    <p:notesMasterId r:id="rId27"/>
+    <p:notesMasterId r:id="rId31"/>
   </p:notesMasterIdLst>
   <p:sldIdLst>
     <p:sldId id="1824" r:id="rId2"/>
@@ -22,17 +22,21 @@
     <p:sldId id="2702" r:id="rId13"/>
     <p:sldId id="2696" r:id="rId14"/>
     <p:sldId id="1982" r:id="rId15"/>
-    <p:sldId id="2700" r:id="rId16"/>
-    <p:sldId id="2701" r:id="rId17"/>
-    <p:sldId id="2669" r:id="rId18"/>
-    <p:sldId id="2703" r:id="rId19"/>
-    <p:sldId id="1983" r:id="rId20"/>
-    <p:sldId id="2670" r:id="rId21"/>
-    <p:sldId id="1984" r:id="rId22"/>
-    <p:sldId id="2697" r:id="rId23"/>
-    <p:sldId id="2698" r:id="rId24"/>
-    <p:sldId id="2699" r:id="rId25"/>
-    <p:sldId id="1825" r:id="rId26"/>
+    <p:sldId id="2705" r:id="rId16"/>
+    <p:sldId id="2707" r:id="rId17"/>
+    <p:sldId id="2706" r:id="rId18"/>
+    <p:sldId id="2701" r:id="rId19"/>
+    <p:sldId id="2669" r:id="rId20"/>
+    <p:sldId id="2703" r:id="rId21"/>
+    <p:sldId id="1983" r:id="rId22"/>
+    <p:sldId id="2670" r:id="rId23"/>
+    <p:sldId id="2708" r:id="rId24"/>
+    <p:sldId id="2709" r:id="rId25"/>
+    <p:sldId id="1984" r:id="rId26"/>
+    <p:sldId id="2697" r:id="rId27"/>
+    <p:sldId id="2698" r:id="rId28"/>
+    <p:sldId id="2699" r:id="rId29"/>
+    <p:sldId id="1825" r:id="rId30"/>
   </p:sldIdLst>
   <p:sldSz cx="12192000" cy="6858000"/>
   <p:notesSz cx="6858000" cy="9144000"/>
@@ -233,7 +237,7 @@
           <a:p>
             <a:fld id="{33ABCB33-BD9C-46EE-9C7B-5E1CA833BD17}" type="datetimeFigureOut">
               <a:rPr lang="en-US" smtClean="0"/>
-              <a:t>10/10/2024</a:t>
+              <a:t>10/11/24</a:t>
             </a:fld>
             <a:endParaRPr lang="en-US"/>
           </a:p>
@@ -1056,7 +1060,13 @@
   <p:cSld>
     <p:spTree>
       <p:nvGrpSpPr>
-        <p:cNvPr id="1" name=""/>
+        <p:cNvPr id="1" name="">
+          <a:extLst>
+            <a:ext uri="{FF2B5EF4-FFF2-40B4-BE49-F238E27FC236}">
+              <a16:creationId xmlns:a16="http://schemas.microsoft.com/office/drawing/2014/main" id="{4C978B6E-6957-78D2-2A40-F2EBB4389EE9}"/>
+            </a:ext>
+          </a:extLst>
+        </p:cNvPr>
         <p:cNvGrpSpPr/>
         <p:nvPr/>
       </p:nvGrpSpPr>
@@ -1070,7 +1080,13 @@
       </p:grpSpPr>
       <p:sp>
         <p:nvSpPr>
-          <p:cNvPr id="2" name="幻灯片图像占位符 1"/>
+          <p:cNvPr id="2" name="幻灯片图像占位符 1">
+            <a:extLst>
+              <a:ext uri="{FF2B5EF4-FFF2-40B4-BE49-F238E27FC236}">
+                <a16:creationId xmlns:a16="http://schemas.microsoft.com/office/drawing/2014/main" id="{EA01E73E-AC6B-125C-E9DE-9AB11E6AEBB0}"/>
+              </a:ext>
+            </a:extLst>
+          </p:cNvPr>
           <p:cNvSpPr>
             <a:spLocks noGrp="1" noRot="1" noChangeAspect="1"/>
           </p:cNvSpPr>
@@ -1082,7 +1098,13 @@
       </p:sp>
       <p:sp>
         <p:nvSpPr>
-          <p:cNvPr id="3" name="备注占位符 2"/>
+          <p:cNvPr id="3" name="备注占位符 2">
+            <a:extLst>
+              <a:ext uri="{FF2B5EF4-FFF2-40B4-BE49-F238E27FC236}">
+                <a16:creationId xmlns:a16="http://schemas.microsoft.com/office/drawing/2014/main" id="{50DEB3EF-2ECA-6BE2-89B5-E3E48D7550C3}"/>
+              </a:ext>
+            </a:extLst>
+          </p:cNvPr>
           <p:cNvSpPr>
             <a:spLocks noGrp="1"/>
           </p:cNvSpPr>
@@ -1108,11 +1130,27 @@
             </a:r>
             <a:endParaRPr lang="en-US" altLang="zh-CN" dirty="0"/>
           </a:p>
+          <a:p>
+            <a:r>
+              <a:rPr lang="zh-CN" altLang="en-US" dirty="0"/>
+              <a:t>本文的工作恢复的主要目标是内存对象的边界和生命周期。</a:t>
+            </a:r>
+            <a:endParaRPr lang="en-US" altLang="zh-CN" dirty="0"/>
+          </a:p>
+          <a:p>
+            <a:endParaRPr lang="en-US" altLang="zh-CN" dirty="0"/>
+          </a:p>
         </p:txBody>
       </p:sp>
       <p:sp>
         <p:nvSpPr>
-          <p:cNvPr id="4" name="灯片编号占位符 3"/>
+          <p:cNvPr id="4" name="灯片编号占位符 3">
+            <a:extLst>
+              <a:ext uri="{FF2B5EF4-FFF2-40B4-BE49-F238E27FC236}">
+                <a16:creationId xmlns:a16="http://schemas.microsoft.com/office/drawing/2014/main" id="{D8F02242-8D00-676A-A04A-9C2E8617C71F}"/>
+              </a:ext>
+            </a:extLst>
+          </p:cNvPr>
           <p:cNvSpPr>
             <a:spLocks noGrp="1"/>
           </p:cNvSpPr>
@@ -1142,7 +1180,7 @@
     </p:spTree>
     <p:extLst>
       <p:ext uri="{BB962C8B-B14F-4D97-AF65-F5344CB8AC3E}">
-        <p14:creationId xmlns:p14="http://schemas.microsoft.com/office/powerpoint/2010/main" val="1316717273"/>
+        <p14:creationId xmlns:p14="http://schemas.microsoft.com/office/powerpoint/2010/main" val="3067794263"/>
       </p:ext>
     </p:extLst>
   </p:cSld>
@@ -1157,7 +1195,13 @@
   <p:cSld>
     <p:spTree>
       <p:nvGrpSpPr>
-        <p:cNvPr id="1" name=""/>
+        <p:cNvPr id="1" name="">
+          <a:extLst>
+            <a:ext uri="{FF2B5EF4-FFF2-40B4-BE49-F238E27FC236}">
+              <a16:creationId xmlns:a16="http://schemas.microsoft.com/office/drawing/2014/main" id="{2F7AEF9A-EA0B-34FB-BDC1-2B76D65438DA}"/>
+            </a:ext>
+          </a:extLst>
+        </p:cNvPr>
         <p:cNvGrpSpPr/>
         <p:nvPr/>
       </p:nvGrpSpPr>
@@ -1171,7 +1215,13 @@
       </p:grpSpPr>
       <p:sp>
         <p:nvSpPr>
-          <p:cNvPr id="2" name="幻灯片图像占位符 1"/>
+          <p:cNvPr id="2" name="幻灯片图像占位符 1">
+            <a:extLst>
+              <a:ext uri="{FF2B5EF4-FFF2-40B4-BE49-F238E27FC236}">
+                <a16:creationId xmlns:a16="http://schemas.microsoft.com/office/drawing/2014/main" id="{F91A7395-C984-5A10-C7FA-A794F84A6517}"/>
+              </a:ext>
+            </a:extLst>
+          </p:cNvPr>
           <p:cNvSpPr>
             <a:spLocks noGrp="1" noRot="1" noChangeAspect="1"/>
           </p:cNvSpPr>
@@ -1183,7 +1233,13 @@
       </p:sp>
       <p:sp>
         <p:nvSpPr>
-          <p:cNvPr id="3" name="备注占位符 2"/>
+          <p:cNvPr id="3" name="备注占位符 2">
+            <a:extLst>
+              <a:ext uri="{FF2B5EF4-FFF2-40B4-BE49-F238E27FC236}">
+                <a16:creationId xmlns:a16="http://schemas.microsoft.com/office/drawing/2014/main" id="{BE371BEB-FAD5-B08A-C717-B651BE546BC4}"/>
+              </a:ext>
+            </a:extLst>
+          </p:cNvPr>
           <p:cNvSpPr>
             <a:spLocks noGrp="1"/>
           </p:cNvSpPr>
@@ -1196,13 +1252,71 @@
           <a:bodyPr/>
           <a:lstStyle/>
           <a:p>
-            <a:endParaRPr lang="zh-CN" altLang="en-US"/>
+            <a:r>
+              <a:rPr lang="zh-CN" altLang="en-US" dirty="0"/>
+              <a:t>值集分析（</a:t>
+            </a:r>
+            <a:r>
+              <a:rPr lang="en-US" altLang="zh-CN" dirty="0"/>
+              <a:t>value-set</a:t>
+            </a:r>
+            <a:r>
+              <a:rPr lang="zh-CN" altLang="en-US" dirty="0"/>
+              <a:t> </a:t>
+            </a:r>
+            <a:r>
+              <a:rPr lang="en-US" altLang="zh-CN" dirty="0"/>
+              <a:t>analysis</a:t>
+            </a:r>
+            <a:r>
+              <a:rPr lang="zh-CN" altLang="en-US" dirty="0"/>
+              <a:t>，</a:t>
+            </a:r>
+            <a:r>
+              <a:rPr lang="en-US" altLang="zh-CN" dirty="0"/>
+              <a:t>VSA</a:t>
+            </a:r>
+            <a:r>
+              <a:rPr lang="zh-CN" altLang="en-US" dirty="0"/>
+              <a:t>）是一种静态分析技术，用于推断程序中每个指针或变量可能取到的一组值。</a:t>
+            </a:r>
+            <a:r>
+              <a:rPr lang="en-US" dirty="0"/>
+              <a:t>VSA </a:t>
+            </a:r>
+            <a:r>
+              <a:rPr lang="zh-CN" altLang="en-US" dirty="0"/>
+              <a:t>尤其适用于分析程序中指针的可能指向位置和内存地址范围，帮助理解变量在不同执行路径上的行为。</a:t>
+            </a:r>
+          </a:p>
+          <a:p>
+            <a:r>
+              <a:rPr lang="zh-CN" altLang="en-US" dirty="0"/>
+              <a:t>在 </a:t>
+            </a:r>
+            <a:r>
+              <a:rPr lang="en-US" dirty="0"/>
+              <a:t>VSA </a:t>
+            </a:r>
+            <a:r>
+              <a:rPr lang="zh-CN" altLang="en-US" dirty="0"/>
+              <a:t>中，通过分析程序的控制流和数据流，确定指针在程序各个位置可能指向的内存地址集合。这对于检测内存越界、非法访问等问题非常有用，特别是在没有源代码的情况下，通过分析二进制代码来推断程序的行为。</a:t>
+            </a:r>
+          </a:p>
+          <a:p>
+            <a:endParaRPr lang="en-US" altLang="zh-CN" dirty="0"/>
           </a:p>
         </p:txBody>
       </p:sp>
       <p:sp>
         <p:nvSpPr>
-          <p:cNvPr id="4" name="灯片编号占位符 3"/>
+          <p:cNvPr id="4" name="灯片编号占位符 3">
+            <a:extLst>
+              <a:ext uri="{FF2B5EF4-FFF2-40B4-BE49-F238E27FC236}">
+                <a16:creationId xmlns:a16="http://schemas.microsoft.com/office/drawing/2014/main" id="{CB659B87-E874-3C6F-CF5B-A8F4A666A971}"/>
+              </a:ext>
+            </a:extLst>
+          </p:cNvPr>
           <p:cNvSpPr>
             <a:spLocks noGrp="1"/>
           </p:cNvSpPr>
@@ -1232,7 +1346,7 @@
     </p:spTree>
     <p:extLst>
       <p:ext uri="{BB962C8B-B14F-4D97-AF65-F5344CB8AC3E}">
-        <p14:creationId xmlns:p14="http://schemas.microsoft.com/office/powerpoint/2010/main" val="2628288756"/>
+        <p14:creationId xmlns:p14="http://schemas.microsoft.com/office/powerpoint/2010/main" val="2165658443"/>
       </p:ext>
     </p:extLst>
   </p:cSld>
@@ -1247,7 +1361,13 @@
   <p:cSld>
     <p:spTree>
       <p:nvGrpSpPr>
-        <p:cNvPr id="1" name=""/>
+        <p:cNvPr id="1" name="">
+          <a:extLst>
+            <a:ext uri="{FF2B5EF4-FFF2-40B4-BE49-F238E27FC236}">
+              <a16:creationId xmlns:a16="http://schemas.microsoft.com/office/drawing/2014/main" id="{E0B3D44C-FBF5-7F27-EADD-0747A180A827}"/>
+            </a:ext>
+          </a:extLst>
+        </p:cNvPr>
         <p:cNvGrpSpPr/>
         <p:nvPr/>
       </p:nvGrpSpPr>
@@ -1261,7 +1381,13 @@
       </p:grpSpPr>
       <p:sp>
         <p:nvSpPr>
-          <p:cNvPr id="2" name="幻灯片图像占位符 1"/>
+          <p:cNvPr id="2" name="幻灯片图像占位符 1">
+            <a:extLst>
+              <a:ext uri="{FF2B5EF4-FFF2-40B4-BE49-F238E27FC236}">
+                <a16:creationId xmlns:a16="http://schemas.microsoft.com/office/drawing/2014/main" id="{E2FE336F-98E4-38DC-7C4D-06AE1175224C}"/>
+              </a:ext>
+            </a:extLst>
+          </p:cNvPr>
           <p:cNvSpPr>
             <a:spLocks noGrp="1" noRot="1" noChangeAspect="1"/>
           </p:cNvSpPr>
@@ -1273,7 +1399,13 @@
       </p:sp>
       <p:sp>
         <p:nvSpPr>
-          <p:cNvPr id="3" name="备注占位符 2"/>
+          <p:cNvPr id="3" name="备注占位符 2">
+            <a:extLst>
+              <a:ext uri="{FF2B5EF4-FFF2-40B4-BE49-F238E27FC236}">
+                <a16:creationId xmlns:a16="http://schemas.microsoft.com/office/drawing/2014/main" id="{4FC2A9E0-8D61-F67E-69A6-94C2A0BA99CE}"/>
+              </a:ext>
+            </a:extLst>
+          </p:cNvPr>
           <p:cNvSpPr>
             <a:spLocks noGrp="1"/>
           </p:cNvSpPr>
@@ -1286,13 +1418,47 @@
           <a:bodyPr/>
           <a:lstStyle/>
           <a:p>
-            <a:endParaRPr lang="zh-CN" altLang="en-US"/>
+            <a:r>
+              <a:rPr lang="zh-CN" altLang="en-US" dirty="0"/>
+              <a:t>为了减少误报率，进一步提高</a:t>
+            </a:r>
+            <a:r>
+              <a:rPr lang="en-US" altLang="zh-CN" dirty="0"/>
+              <a:t>Sanitizer</a:t>
+            </a:r>
+            <a:r>
+              <a:rPr lang="zh-CN" altLang="en-US" dirty="0"/>
+              <a:t>的性能，</a:t>
+            </a:r>
+            <a:r>
+              <a:rPr lang="en-US" altLang="zh-CN" dirty="0" err="1"/>
+              <a:t>MTSan</a:t>
+            </a:r>
+            <a:r>
+              <a:rPr lang="zh-CN" altLang="en-US" dirty="0"/>
+              <a:t>对恢复出来的对象属性进行了一个分类，一种是已经确定的对象属性，另一个是推断的对象属性。确定的对象属性意味着这个属性一旦被</a:t>
+            </a:r>
+            <a:r>
+              <a:rPr lang="en-US" altLang="zh-CN" dirty="0" err="1"/>
+              <a:t>MTSan</a:t>
+            </a:r>
+            <a:r>
+              <a:rPr lang="zh-CN" altLang="en-US" dirty="0"/>
+              <a:t>推断出来就是正确的。而 推断的对象属性则有错误的可能</a:t>
+            </a:r>
+            <a:endParaRPr lang="en-US" altLang="zh-CN" dirty="0"/>
           </a:p>
         </p:txBody>
       </p:sp>
       <p:sp>
         <p:nvSpPr>
-          <p:cNvPr id="4" name="灯片编号占位符 3"/>
+          <p:cNvPr id="4" name="灯片编号占位符 3">
+            <a:extLst>
+              <a:ext uri="{FF2B5EF4-FFF2-40B4-BE49-F238E27FC236}">
+                <a16:creationId xmlns:a16="http://schemas.microsoft.com/office/drawing/2014/main" id="{39C85A93-9DE4-EEE6-5070-E41886A8E649}"/>
+              </a:ext>
+            </a:extLst>
+          </p:cNvPr>
           <p:cNvSpPr>
             <a:spLocks noGrp="1"/>
           </p:cNvSpPr>
@@ -1322,7 +1488,7 @@
     </p:spTree>
     <p:extLst>
       <p:ext uri="{BB962C8B-B14F-4D97-AF65-F5344CB8AC3E}">
-        <p14:creationId xmlns:p14="http://schemas.microsoft.com/office/powerpoint/2010/main" val="2584489241"/>
+        <p14:creationId xmlns:p14="http://schemas.microsoft.com/office/powerpoint/2010/main" val="1423779639"/>
       </p:ext>
     </p:extLst>
   </p:cSld>
@@ -1412,7 +1578,7 @@
     </p:spTree>
     <p:extLst>
       <p:ext uri="{BB962C8B-B14F-4D97-AF65-F5344CB8AC3E}">
-        <p14:creationId xmlns:p14="http://schemas.microsoft.com/office/powerpoint/2010/main" val="184955416"/>
+        <p14:creationId xmlns:p14="http://schemas.microsoft.com/office/powerpoint/2010/main" val="2628288756"/>
       </p:ext>
     </p:extLst>
   </p:cSld>
@@ -1449,12 +1615,7 @@
             <p:ph type="sldImg"/>
           </p:nvPr>
         </p:nvSpPr>
-        <p:spPr>
-          <a:xfrm>
-            <a:off x="685800" y="1143000"/>
-            <a:ext cx="5486400" cy="3086100"/>
-          </a:xfrm>
-        </p:spPr>
+        <p:spPr/>
       </p:sp>
       <p:sp>
         <p:nvSpPr>
@@ -1507,7 +1668,7 @@
     </p:spTree>
     <p:extLst>
       <p:ext uri="{BB962C8B-B14F-4D97-AF65-F5344CB8AC3E}">
-        <p14:creationId xmlns:p14="http://schemas.microsoft.com/office/powerpoint/2010/main" val="2123578710"/>
+        <p14:creationId xmlns:p14="http://schemas.microsoft.com/office/powerpoint/2010/main" val="2584489241"/>
       </p:ext>
     </p:extLst>
   </p:cSld>
@@ -1687,7 +1848,7 @@
     </p:spTree>
     <p:extLst>
       <p:ext uri="{BB962C8B-B14F-4D97-AF65-F5344CB8AC3E}">
-        <p14:creationId xmlns:p14="http://schemas.microsoft.com/office/powerpoint/2010/main" val="3844243761"/>
+        <p14:creationId xmlns:p14="http://schemas.microsoft.com/office/powerpoint/2010/main" val="184955416"/>
       </p:ext>
     </p:extLst>
   </p:cSld>
@@ -1782,7 +1943,7 @@
     </p:spTree>
     <p:extLst>
       <p:ext uri="{BB962C8B-B14F-4D97-AF65-F5344CB8AC3E}">
-        <p14:creationId xmlns:p14="http://schemas.microsoft.com/office/powerpoint/2010/main" val="1071875887"/>
+        <p14:creationId xmlns:p14="http://schemas.microsoft.com/office/powerpoint/2010/main" val="2123578710"/>
       </p:ext>
     </p:extLst>
   </p:cSld>
@@ -1872,7 +2033,7 @@
     </p:spTree>
     <p:extLst>
       <p:ext uri="{BB962C8B-B14F-4D97-AF65-F5344CB8AC3E}">
-        <p14:creationId xmlns:p14="http://schemas.microsoft.com/office/powerpoint/2010/main" val="1819013465"/>
+        <p14:creationId xmlns:p14="http://schemas.microsoft.com/office/powerpoint/2010/main" val="3844243761"/>
       </p:ext>
     </p:extLst>
   </p:cSld>
@@ -1887,7 +2048,13 @@
   <p:cSld>
     <p:spTree>
       <p:nvGrpSpPr>
-        <p:cNvPr id="1" name=""/>
+        <p:cNvPr id="1" name="">
+          <a:extLst>
+            <a:ext uri="{FF2B5EF4-FFF2-40B4-BE49-F238E27FC236}">
+              <a16:creationId xmlns:a16="http://schemas.microsoft.com/office/drawing/2014/main" id="{29A8733B-097B-72EB-7A21-9F36EC56BB5B}"/>
+            </a:ext>
+          </a:extLst>
+        </p:cNvPr>
         <p:cNvGrpSpPr/>
         <p:nvPr/>
       </p:nvGrpSpPr>
@@ -1901,7 +2068,13 @@
       </p:grpSpPr>
       <p:sp>
         <p:nvSpPr>
-          <p:cNvPr id="2" name="幻灯片图像占位符 1"/>
+          <p:cNvPr id="2" name="幻灯片图像占位符 1">
+            <a:extLst>
+              <a:ext uri="{FF2B5EF4-FFF2-40B4-BE49-F238E27FC236}">
+                <a16:creationId xmlns:a16="http://schemas.microsoft.com/office/drawing/2014/main" id="{DB0650FC-243D-F929-EEEC-DB4F5C94D35E}"/>
+              </a:ext>
+            </a:extLst>
+          </p:cNvPr>
           <p:cNvSpPr>
             <a:spLocks noGrp="1" noRot="1" noChangeAspect="1"/>
           </p:cNvSpPr>
@@ -1913,7 +2086,13 @@
       </p:sp>
       <p:sp>
         <p:nvSpPr>
-          <p:cNvPr id="3" name="备注占位符 2"/>
+          <p:cNvPr id="3" name="备注占位符 2">
+            <a:extLst>
+              <a:ext uri="{FF2B5EF4-FFF2-40B4-BE49-F238E27FC236}">
+                <a16:creationId xmlns:a16="http://schemas.microsoft.com/office/drawing/2014/main" id="{C1F6D3CA-841A-B14C-F6DE-5739CD827E6C}"/>
+              </a:ext>
+            </a:extLst>
+          </p:cNvPr>
           <p:cNvSpPr>
             <a:spLocks noGrp="1"/>
           </p:cNvSpPr>
@@ -1932,7 +2111,13 @@
       </p:sp>
       <p:sp>
         <p:nvSpPr>
-          <p:cNvPr id="4" name="灯片编号占位符 3"/>
+          <p:cNvPr id="4" name="灯片编号占位符 3">
+            <a:extLst>
+              <a:ext uri="{FF2B5EF4-FFF2-40B4-BE49-F238E27FC236}">
+                <a16:creationId xmlns:a16="http://schemas.microsoft.com/office/drawing/2014/main" id="{DB1C26E9-BBEB-579D-98D7-50965CF473C5}"/>
+              </a:ext>
+            </a:extLst>
+          </p:cNvPr>
           <p:cNvSpPr>
             <a:spLocks noGrp="1"/>
           </p:cNvSpPr>
@@ -1962,7 +2147,7 @@
     </p:spTree>
     <p:extLst>
       <p:ext uri="{BB962C8B-B14F-4D97-AF65-F5344CB8AC3E}">
-        <p14:creationId xmlns:p14="http://schemas.microsoft.com/office/powerpoint/2010/main" val="2872485453"/>
+        <p14:creationId xmlns:p14="http://schemas.microsoft.com/office/powerpoint/2010/main" val="3306989193"/>
       </p:ext>
     </p:extLst>
   </p:cSld>
@@ -1977,7 +2162,13 @@
   <p:cSld>
     <p:spTree>
       <p:nvGrpSpPr>
-        <p:cNvPr id="1" name=""/>
+        <p:cNvPr id="1" name="">
+          <a:extLst>
+            <a:ext uri="{FF2B5EF4-FFF2-40B4-BE49-F238E27FC236}">
+              <a16:creationId xmlns:a16="http://schemas.microsoft.com/office/drawing/2014/main" id="{DE77925A-9977-FE3C-430C-7C786541253C}"/>
+            </a:ext>
+          </a:extLst>
+        </p:cNvPr>
         <p:cNvGrpSpPr/>
         <p:nvPr/>
       </p:nvGrpSpPr>
@@ -1991,7 +2182,13 @@
       </p:grpSpPr>
       <p:sp>
         <p:nvSpPr>
-          <p:cNvPr id="2" name="幻灯片图像占位符 1"/>
+          <p:cNvPr id="2" name="幻灯片图像占位符 1">
+            <a:extLst>
+              <a:ext uri="{FF2B5EF4-FFF2-40B4-BE49-F238E27FC236}">
+                <a16:creationId xmlns:a16="http://schemas.microsoft.com/office/drawing/2014/main" id="{3B9ACB86-ED09-0621-115C-D422ADDBE129}"/>
+              </a:ext>
+            </a:extLst>
+          </p:cNvPr>
           <p:cNvSpPr>
             <a:spLocks noGrp="1" noRot="1" noChangeAspect="1"/>
           </p:cNvSpPr>
@@ -2003,7 +2200,13 @@
       </p:sp>
       <p:sp>
         <p:nvSpPr>
-          <p:cNvPr id="3" name="备注占位符 2"/>
+          <p:cNvPr id="3" name="备注占位符 2">
+            <a:extLst>
+              <a:ext uri="{FF2B5EF4-FFF2-40B4-BE49-F238E27FC236}">
+                <a16:creationId xmlns:a16="http://schemas.microsoft.com/office/drawing/2014/main" id="{C7E879C8-DA47-F21D-FA75-742DCBBB6A35}"/>
+              </a:ext>
+            </a:extLst>
+          </p:cNvPr>
           <p:cNvSpPr>
             <a:spLocks noGrp="1"/>
           </p:cNvSpPr>
@@ -2022,7 +2225,13 @@
       </p:sp>
       <p:sp>
         <p:nvSpPr>
-          <p:cNvPr id="4" name="灯片编号占位符 3"/>
+          <p:cNvPr id="4" name="灯片编号占位符 3">
+            <a:extLst>
+              <a:ext uri="{FF2B5EF4-FFF2-40B4-BE49-F238E27FC236}">
+                <a16:creationId xmlns:a16="http://schemas.microsoft.com/office/drawing/2014/main" id="{40A48507-DC2E-7CA6-4678-02207D5DF50D}"/>
+              </a:ext>
+            </a:extLst>
+          </p:cNvPr>
           <p:cNvSpPr>
             <a:spLocks noGrp="1"/>
           </p:cNvSpPr>
@@ -2052,7 +2261,7 @@
     </p:spTree>
     <p:extLst>
       <p:ext uri="{BB962C8B-B14F-4D97-AF65-F5344CB8AC3E}">
-        <p14:creationId xmlns:p14="http://schemas.microsoft.com/office/powerpoint/2010/main" val="2977062814"/>
+        <p14:creationId xmlns:p14="http://schemas.microsoft.com/office/powerpoint/2010/main" val="2474924553"/>
       </p:ext>
     </p:extLst>
   </p:cSld>
@@ -2139,6 +2348,371 @@
                 <a:defRPr/>
               </a:pPr>
               <a:t>25</a:t>
+            </a:fld>
+            <a:endParaRPr lang="zh-CN" altLang="en-US" dirty="0"/>
+          </a:p>
+        </p:txBody>
+      </p:sp>
+    </p:spTree>
+    <p:extLst>
+      <p:ext uri="{BB962C8B-B14F-4D97-AF65-F5344CB8AC3E}">
+        <p14:creationId xmlns:p14="http://schemas.microsoft.com/office/powerpoint/2010/main" val="1071875887"/>
+      </p:ext>
+    </p:extLst>
+  </p:cSld>
+  <p:clrMapOvr>
+    <a:masterClrMapping/>
+  </p:clrMapOvr>
+</p:notes>
+</file>
+
+<file path=ppt/notesSlides/notesSlide26.xml><?xml version="1.0" encoding="utf-8"?>
+<p:notes xmlns:a="http://schemas.openxmlformats.org/drawingml/2006/main" xmlns:r="http://schemas.openxmlformats.org/officeDocument/2006/relationships" xmlns:p="http://schemas.openxmlformats.org/presentationml/2006/main">
+  <p:cSld>
+    <p:spTree>
+      <p:nvGrpSpPr>
+        <p:cNvPr id="1" name=""/>
+        <p:cNvGrpSpPr/>
+        <p:nvPr/>
+      </p:nvGrpSpPr>
+      <p:grpSpPr>
+        <a:xfrm>
+          <a:off x="0" y="0"/>
+          <a:ext cx="0" cy="0"/>
+          <a:chOff x="0" y="0"/>
+          <a:chExt cx="0" cy="0"/>
+        </a:xfrm>
+      </p:grpSpPr>
+      <p:sp>
+        <p:nvSpPr>
+          <p:cNvPr id="2" name="幻灯片图像占位符 1"/>
+          <p:cNvSpPr>
+            <a:spLocks noGrp="1" noRot="1" noChangeAspect="1"/>
+          </p:cNvSpPr>
+          <p:nvPr>
+            <p:ph type="sldImg"/>
+          </p:nvPr>
+        </p:nvSpPr>
+        <p:spPr/>
+      </p:sp>
+      <p:sp>
+        <p:nvSpPr>
+          <p:cNvPr id="3" name="备注占位符 2"/>
+          <p:cNvSpPr>
+            <a:spLocks noGrp="1"/>
+          </p:cNvSpPr>
+          <p:nvPr>
+            <p:ph type="body" idx="1"/>
+          </p:nvPr>
+        </p:nvSpPr>
+        <p:spPr/>
+        <p:txBody>
+          <a:bodyPr/>
+          <a:lstStyle/>
+          <a:p>
+            <a:endParaRPr lang="zh-CN" altLang="en-US"/>
+          </a:p>
+        </p:txBody>
+      </p:sp>
+      <p:sp>
+        <p:nvSpPr>
+          <p:cNvPr id="4" name="灯片编号占位符 3"/>
+          <p:cNvSpPr>
+            <a:spLocks noGrp="1"/>
+          </p:cNvSpPr>
+          <p:nvPr>
+            <p:ph type="sldNum" sz="quarter" idx="10"/>
+          </p:nvPr>
+        </p:nvSpPr>
+        <p:spPr/>
+        <p:txBody>
+          <a:bodyPr/>
+          <a:lstStyle/>
+          <a:p>
+            <a:pPr>
+              <a:defRPr/>
+            </a:pPr>
+            <a:fld id="{CD7A2CCA-E5D5-4859-8035-B358016F08F8}" type="slidenum">
+              <a:rPr lang="zh-CN" altLang="en-US" smtClean="0"/>
+              <a:pPr>
+                <a:defRPr/>
+              </a:pPr>
+              <a:t>26</a:t>
+            </a:fld>
+            <a:endParaRPr lang="zh-CN" altLang="en-US" dirty="0"/>
+          </a:p>
+        </p:txBody>
+      </p:sp>
+    </p:spTree>
+    <p:extLst>
+      <p:ext uri="{BB962C8B-B14F-4D97-AF65-F5344CB8AC3E}">
+        <p14:creationId xmlns:p14="http://schemas.microsoft.com/office/powerpoint/2010/main" val="1819013465"/>
+      </p:ext>
+    </p:extLst>
+  </p:cSld>
+  <p:clrMapOvr>
+    <a:masterClrMapping/>
+  </p:clrMapOvr>
+</p:notes>
+</file>
+
+<file path=ppt/notesSlides/notesSlide27.xml><?xml version="1.0" encoding="utf-8"?>
+<p:notes xmlns:a="http://schemas.openxmlformats.org/drawingml/2006/main" xmlns:r="http://schemas.openxmlformats.org/officeDocument/2006/relationships" xmlns:p="http://schemas.openxmlformats.org/presentationml/2006/main">
+  <p:cSld>
+    <p:spTree>
+      <p:nvGrpSpPr>
+        <p:cNvPr id="1" name=""/>
+        <p:cNvGrpSpPr/>
+        <p:nvPr/>
+      </p:nvGrpSpPr>
+      <p:grpSpPr>
+        <a:xfrm>
+          <a:off x="0" y="0"/>
+          <a:ext cx="0" cy="0"/>
+          <a:chOff x="0" y="0"/>
+          <a:chExt cx="0" cy="0"/>
+        </a:xfrm>
+      </p:grpSpPr>
+      <p:sp>
+        <p:nvSpPr>
+          <p:cNvPr id="2" name="幻灯片图像占位符 1"/>
+          <p:cNvSpPr>
+            <a:spLocks noGrp="1" noRot="1" noChangeAspect="1"/>
+          </p:cNvSpPr>
+          <p:nvPr>
+            <p:ph type="sldImg"/>
+          </p:nvPr>
+        </p:nvSpPr>
+        <p:spPr/>
+      </p:sp>
+      <p:sp>
+        <p:nvSpPr>
+          <p:cNvPr id="3" name="备注占位符 2"/>
+          <p:cNvSpPr>
+            <a:spLocks noGrp="1"/>
+          </p:cNvSpPr>
+          <p:nvPr>
+            <p:ph type="body" idx="1"/>
+          </p:nvPr>
+        </p:nvSpPr>
+        <p:spPr/>
+        <p:txBody>
+          <a:bodyPr/>
+          <a:lstStyle/>
+          <a:p>
+            <a:endParaRPr lang="zh-CN" altLang="en-US"/>
+          </a:p>
+        </p:txBody>
+      </p:sp>
+      <p:sp>
+        <p:nvSpPr>
+          <p:cNvPr id="4" name="灯片编号占位符 3"/>
+          <p:cNvSpPr>
+            <a:spLocks noGrp="1"/>
+          </p:cNvSpPr>
+          <p:nvPr>
+            <p:ph type="sldNum" sz="quarter" idx="10"/>
+          </p:nvPr>
+        </p:nvSpPr>
+        <p:spPr/>
+        <p:txBody>
+          <a:bodyPr/>
+          <a:lstStyle/>
+          <a:p>
+            <a:pPr>
+              <a:defRPr/>
+            </a:pPr>
+            <a:fld id="{CD7A2CCA-E5D5-4859-8035-B358016F08F8}" type="slidenum">
+              <a:rPr lang="zh-CN" altLang="en-US" smtClean="0"/>
+              <a:pPr>
+                <a:defRPr/>
+              </a:pPr>
+              <a:t>27</a:t>
+            </a:fld>
+            <a:endParaRPr lang="zh-CN" altLang="en-US" dirty="0"/>
+          </a:p>
+        </p:txBody>
+      </p:sp>
+    </p:spTree>
+    <p:extLst>
+      <p:ext uri="{BB962C8B-B14F-4D97-AF65-F5344CB8AC3E}">
+        <p14:creationId xmlns:p14="http://schemas.microsoft.com/office/powerpoint/2010/main" val="2872485453"/>
+      </p:ext>
+    </p:extLst>
+  </p:cSld>
+  <p:clrMapOvr>
+    <a:masterClrMapping/>
+  </p:clrMapOvr>
+</p:notes>
+</file>
+
+<file path=ppt/notesSlides/notesSlide28.xml><?xml version="1.0" encoding="utf-8"?>
+<p:notes xmlns:a="http://schemas.openxmlformats.org/drawingml/2006/main" xmlns:r="http://schemas.openxmlformats.org/officeDocument/2006/relationships" xmlns:p="http://schemas.openxmlformats.org/presentationml/2006/main">
+  <p:cSld>
+    <p:spTree>
+      <p:nvGrpSpPr>
+        <p:cNvPr id="1" name=""/>
+        <p:cNvGrpSpPr/>
+        <p:nvPr/>
+      </p:nvGrpSpPr>
+      <p:grpSpPr>
+        <a:xfrm>
+          <a:off x="0" y="0"/>
+          <a:ext cx="0" cy="0"/>
+          <a:chOff x="0" y="0"/>
+          <a:chExt cx="0" cy="0"/>
+        </a:xfrm>
+      </p:grpSpPr>
+      <p:sp>
+        <p:nvSpPr>
+          <p:cNvPr id="2" name="幻灯片图像占位符 1"/>
+          <p:cNvSpPr>
+            <a:spLocks noGrp="1" noRot="1" noChangeAspect="1"/>
+          </p:cNvSpPr>
+          <p:nvPr>
+            <p:ph type="sldImg"/>
+          </p:nvPr>
+        </p:nvSpPr>
+        <p:spPr/>
+      </p:sp>
+      <p:sp>
+        <p:nvSpPr>
+          <p:cNvPr id="3" name="备注占位符 2"/>
+          <p:cNvSpPr>
+            <a:spLocks noGrp="1"/>
+          </p:cNvSpPr>
+          <p:nvPr>
+            <p:ph type="body" idx="1"/>
+          </p:nvPr>
+        </p:nvSpPr>
+        <p:spPr/>
+        <p:txBody>
+          <a:bodyPr/>
+          <a:lstStyle/>
+          <a:p>
+            <a:endParaRPr lang="zh-CN" altLang="en-US"/>
+          </a:p>
+        </p:txBody>
+      </p:sp>
+      <p:sp>
+        <p:nvSpPr>
+          <p:cNvPr id="4" name="灯片编号占位符 3"/>
+          <p:cNvSpPr>
+            <a:spLocks noGrp="1"/>
+          </p:cNvSpPr>
+          <p:nvPr>
+            <p:ph type="sldNum" sz="quarter" idx="10"/>
+          </p:nvPr>
+        </p:nvSpPr>
+        <p:spPr/>
+        <p:txBody>
+          <a:bodyPr/>
+          <a:lstStyle/>
+          <a:p>
+            <a:pPr>
+              <a:defRPr/>
+            </a:pPr>
+            <a:fld id="{CD7A2CCA-E5D5-4859-8035-B358016F08F8}" type="slidenum">
+              <a:rPr lang="zh-CN" altLang="en-US" smtClean="0"/>
+              <a:pPr>
+                <a:defRPr/>
+              </a:pPr>
+              <a:t>28</a:t>
+            </a:fld>
+            <a:endParaRPr lang="zh-CN" altLang="en-US" dirty="0"/>
+          </a:p>
+        </p:txBody>
+      </p:sp>
+    </p:spTree>
+    <p:extLst>
+      <p:ext uri="{BB962C8B-B14F-4D97-AF65-F5344CB8AC3E}">
+        <p14:creationId xmlns:p14="http://schemas.microsoft.com/office/powerpoint/2010/main" val="2977062814"/>
+      </p:ext>
+    </p:extLst>
+  </p:cSld>
+  <p:clrMapOvr>
+    <a:masterClrMapping/>
+  </p:clrMapOvr>
+</p:notes>
+</file>
+
+<file path=ppt/notesSlides/notesSlide29.xml><?xml version="1.0" encoding="utf-8"?>
+<p:notes xmlns:a="http://schemas.openxmlformats.org/drawingml/2006/main" xmlns:r="http://schemas.openxmlformats.org/officeDocument/2006/relationships" xmlns:p="http://schemas.openxmlformats.org/presentationml/2006/main">
+  <p:cSld>
+    <p:spTree>
+      <p:nvGrpSpPr>
+        <p:cNvPr id="1" name=""/>
+        <p:cNvGrpSpPr/>
+        <p:nvPr/>
+      </p:nvGrpSpPr>
+      <p:grpSpPr>
+        <a:xfrm>
+          <a:off x="0" y="0"/>
+          <a:ext cx="0" cy="0"/>
+          <a:chOff x="0" y="0"/>
+          <a:chExt cx="0" cy="0"/>
+        </a:xfrm>
+      </p:grpSpPr>
+      <p:sp>
+        <p:nvSpPr>
+          <p:cNvPr id="2" name="幻灯片图像占位符 1"/>
+          <p:cNvSpPr>
+            <a:spLocks noGrp="1" noRot="1" noChangeAspect="1"/>
+          </p:cNvSpPr>
+          <p:nvPr>
+            <p:ph type="sldImg"/>
+          </p:nvPr>
+        </p:nvSpPr>
+        <p:spPr>
+          <a:xfrm>
+            <a:off x="685800" y="1143000"/>
+            <a:ext cx="5486400" cy="3086100"/>
+          </a:xfrm>
+        </p:spPr>
+      </p:sp>
+      <p:sp>
+        <p:nvSpPr>
+          <p:cNvPr id="3" name="备注占位符 2"/>
+          <p:cNvSpPr>
+            <a:spLocks noGrp="1"/>
+          </p:cNvSpPr>
+          <p:nvPr>
+            <p:ph type="body" idx="1"/>
+          </p:nvPr>
+        </p:nvSpPr>
+        <p:spPr/>
+        <p:txBody>
+          <a:bodyPr/>
+          <a:lstStyle/>
+          <a:p>
+            <a:endParaRPr lang="zh-CN" altLang="en-US"/>
+          </a:p>
+        </p:txBody>
+      </p:sp>
+      <p:sp>
+        <p:nvSpPr>
+          <p:cNvPr id="4" name="灯片编号占位符 3"/>
+          <p:cNvSpPr>
+            <a:spLocks noGrp="1"/>
+          </p:cNvSpPr>
+          <p:nvPr>
+            <p:ph type="sldNum" sz="quarter" idx="10"/>
+          </p:nvPr>
+        </p:nvSpPr>
+        <p:spPr/>
+        <p:txBody>
+          <a:bodyPr/>
+          <a:lstStyle/>
+          <a:p>
+            <a:pPr>
+              <a:defRPr/>
+            </a:pPr>
+            <a:fld id="{CD7A2CCA-E5D5-4859-8035-B358016F08F8}" type="slidenum">
+              <a:rPr lang="zh-CN" altLang="en-US" smtClean="0"/>
+              <a:pPr>
+                <a:defRPr/>
+              </a:pPr>
+              <a:t>29</a:t>
             </a:fld>
             <a:endParaRPr lang="zh-CN" altLang="en-US" dirty="0"/>
           </a:p>
@@ -3160,7 +3734,7 @@
           <a:p>
             <a:fld id="{606DFA50-1002-4768-83F7-4A6853F86C5A}" type="datetimeFigureOut">
               <a:rPr lang="en-US" smtClean="0"/>
-              <a:t>10/10/2024</a:t>
+              <a:t>10/11/24</a:t>
             </a:fld>
             <a:endParaRPr lang="en-US"/>
           </a:p>
@@ -3360,7 +3934,7 @@
           <a:p>
             <a:fld id="{606DFA50-1002-4768-83F7-4A6853F86C5A}" type="datetimeFigureOut">
               <a:rPr lang="en-US" smtClean="0"/>
-              <a:t>10/10/2024</a:t>
+              <a:t>10/11/24</a:t>
             </a:fld>
             <a:endParaRPr lang="en-US"/>
           </a:p>
@@ -3570,7 +4144,7 @@
           <a:p>
             <a:fld id="{606DFA50-1002-4768-83F7-4A6853F86C5A}" type="datetimeFigureOut">
               <a:rPr lang="en-US" smtClean="0"/>
-              <a:t>10/10/2024</a:t>
+              <a:t>10/11/24</a:t>
             </a:fld>
             <a:endParaRPr lang="en-US"/>
           </a:p>
@@ -24418,7 +24992,7 @@
           <a:p>
             <a:fld id="{606DFA50-1002-4768-83F7-4A6853F86C5A}" type="datetimeFigureOut">
               <a:rPr lang="en-US" smtClean="0"/>
-              <a:t>10/10/2024</a:t>
+              <a:t>10/11/24</a:t>
             </a:fld>
             <a:endParaRPr lang="en-US"/>
           </a:p>
@@ -24694,7 +25268,7 @@
           <a:p>
             <a:fld id="{606DFA50-1002-4768-83F7-4A6853F86C5A}" type="datetimeFigureOut">
               <a:rPr lang="en-US" smtClean="0"/>
-              <a:t>10/10/2024</a:t>
+              <a:t>10/11/24</a:t>
             </a:fld>
             <a:endParaRPr lang="en-US"/>
           </a:p>
@@ -24962,7 +25536,7 @@
           <a:p>
             <a:fld id="{606DFA50-1002-4768-83F7-4A6853F86C5A}" type="datetimeFigureOut">
               <a:rPr lang="en-US" smtClean="0"/>
-              <a:t>10/10/2024</a:t>
+              <a:t>10/11/24</a:t>
             </a:fld>
             <a:endParaRPr lang="en-US"/>
           </a:p>
@@ -25377,7 +25951,7 @@
           <a:p>
             <a:fld id="{606DFA50-1002-4768-83F7-4A6853F86C5A}" type="datetimeFigureOut">
               <a:rPr lang="en-US" smtClean="0"/>
-              <a:t>10/10/2024</a:t>
+              <a:t>10/11/24</a:t>
             </a:fld>
             <a:endParaRPr lang="en-US"/>
           </a:p>
@@ -25519,7 +26093,7 @@
           <a:p>
             <a:fld id="{606DFA50-1002-4768-83F7-4A6853F86C5A}" type="datetimeFigureOut">
               <a:rPr lang="en-US" smtClean="0"/>
-              <a:t>10/10/2024</a:t>
+              <a:t>10/11/24</a:t>
             </a:fld>
             <a:endParaRPr lang="en-US"/>
           </a:p>
@@ -25632,7 +26206,7 @@
           <a:p>
             <a:fld id="{606DFA50-1002-4768-83F7-4A6853F86C5A}" type="datetimeFigureOut">
               <a:rPr lang="en-US" smtClean="0"/>
-              <a:t>10/10/2024</a:t>
+              <a:t>10/11/24</a:t>
             </a:fld>
             <a:endParaRPr lang="en-US"/>
           </a:p>
@@ -25945,7 +26519,7 @@
           <a:p>
             <a:fld id="{606DFA50-1002-4768-83F7-4A6853F86C5A}" type="datetimeFigureOut">
               <a:rPr lang="en-US" smtClean="0"/>
-              <a:t>10/10/2024</a:t>
+              <a:t>10/11/24</a:t>
             </a:fld>
             <a:endParaRPr lang="en-US"/>
           </a:p>
@@ -26234,7 +26808,7 @@
           <a:p>
             <a:fld id="{606DFA50-1002-4768-83F7-4A6853F86C5A}" type="datetimeFigureOut">
               <a:rPr lang="en-US" smtClean="0"/>
-              <a:t>10/10/2024</a:t>
+              <a:t>10/11/24</a:t>
             </a:fld>
             <a:endParaRPr lang="en-US"/>
           </a:p>
@@ -26477,7 +27051,7 @@
           <a:p>
             <a:fld id="{606DFA50-1002-4768-83F7-4A6853F86C5A}" type="datetimeFigureOut">
               <a:rPr lang="en-US" smtClean="0"/>
-              <a:t>10/10/2024</a:t>
+              <a:t>10/11/24</a:t>
             </a:fld>
             <a:endParaRPr lang="en-US"/>
           </a:p>
@@ -26984,7 +27558,7 @@
                   <a:spcPct val="110000"/>
                 </a:lnSpc>
               </a:pPr>
-              <a:t>2024/10/10</a:t>
+              <a:t>2024/10/11</a:t>
             </a:fld>
             <a:endParaRPr lang="zh-CN" altLang="en-US" dirty="0">
               <a:latin typeface="微软雅黑" panose="020B0503020204020204" pitchFamily="34" charset="-122"/>
@@ -28182,21 +28756,7 @@
                 <a:latin typeface="微软雅黑" panose="020B0503020204020204" pitchFamily="34" charset="-122"/>
                 <a:ea typeface="微软雅黑" panose="020B0503020204020204" pitchFamily="34" charset="-122"/>
               </a:rPr>
-              <a:t>。为简化这一</a:t>
-            </a:r>
-            <a:r>
-              <a:rPr lang="zh-CN" altLang="en-US" sz="2200">
-                <a:latin typeface="微软雅黑" panose="020B0503020204020204" pitchFamily="34" charset="-122"/>
-                <a:ea typeface="微软雅黑" panose="020B0503020204020204" pitchFamily="34" charset="-122"/>
-              </a:rPr>
-              <a:t>过程，本文作者实现</a:t>
-            </a:r>
-            <a:r>
-              <a:rPr lang="zh-CN" altLang="en-US" sz="2200" dirty="0">
-                <a:latin typeface="微软雅黑" panose="020B0503020204020204" pitchFamily="34" charset="-122"/>
-                <a:ea typeface="微软雅黑" panose="020B0503020204020204" pitchFamily="34" charset="-122"/>
-              </a:rPr>
-              <a:t>了一个库 </a:t>
+              <a:t>。为简化这一过程，本文作者实现了一个库 </a:t>
             </a:r>
             <a:r>
               <a:rPr lang="en-US" altLang="zh-CN" sz="2200" dirty="0" err="1">
@@ -29960,7 +30520,13 @@
   <p:cSld>
     <p:spTree>
       <p:nvGrpSpPr>
-        <p:cNvPr id="1" name=""/>
+        <p:cNvPr id="1" name="">
+          <a:extLst>
+            <a:ext uri="{FF2B5EF4-FFF2-40B4-BE49-F238E27FC236}">
+              <a16:creationId xmlns:a16="http://schemas.microsoft.com/office/drawing/2014/main" id="{F7F2CBA6-EB86-F3F2-2684-A632A2ECBC66}"/>
+            </a:ext>
+          </a:extLst>
+        </p:cNvPr>
         <p:cNvGrpSpPr/>
         <p:nvPr/>
       </p:nvGrpSpPr>
@@ -29974,7 +30540,13 @@
       </p:grpSpPr>
       <p:sp>
         <p:nvSpPr>
-          <p:cNvPr id="9" name="标题 8"/>
+          <p:cNvPr id="9" name="标题 8">
+            <a:extLst>
+              <a:ext uri="{FF2B5EF4-FFF2-40B4-BE49-F238E27FC236}">
+                <a16:creationId xmlns:a16="http://schemas.microsoft.com/office/drawing/2014/main" id="{860B1CB7-B486-975E-B02C-30CECA276C20}"/>
+              </a:ext>
+            </a:extLst>
+          </p:cNvPr>
           <p:cNvSpPr>
             <a:spLocks noGrp="1"/>
           </p:cNvSpPr>
@@ -29999,10 +30571,474 @@
           </a:p>
         </p:txBody>
       </p:sp>
+      <p:sp>
+        <p:nvSpPr>
+          <p:cNvPr id="2" name="文本框 2">
+            <a:extLst>
+              <a:ext uri="{FF2B5EF4-FFF2-40B4-BE49-F238E27FC236}">
+                <a16:creationId xmlns:a16="http://schemas.microsoft.com/office/drawing/2014/main" id="{D78BBDF1-F2E4-0469-A816-41204110F7AA}"/>
+              </a:ext>
+            </a:extLst>
+          </p:cNvPr>
+          <p:cNvSpPr txBox="1"/>
+          <p:nvPr/>
+        </p:nvSpPr>
+        <p:spPr>
+          <a:xfrm>
+            <a:off x="468122" y="1832707"/>
+            <a:ext cx="5248516" cy="4493731"/>
+          </a:xfrm>
+          <a:prstGeom prst="rect">
+            <a:avLst/>
+          </a:prstGeom>
+          <a:noFill/>
+        </p:spPr>
+        <p:txBody>
+          <a:bodyPr wrap="square" rtlCol="0">
+            <a:spAutoFit/>
+          </a:bodyPr>
+          <a:lstStyle/>
+          <a:p>
+            <a:pPr marL="342900" indent="-342900" algn="just" eaLnBrk="1">
+              <a:lnSpc>
+                <a:spcPct val="130000"/>
+              </a:lnSpc>
+              <a:spcBef>
+                <a:spcPts val="600"/>
+              </a:spcBef>
+              <a:spcAft>
+                <a:spcPts val="600"/>
+              </a:spcAft>
+              <a:buClr>
+                <a:schemeClr val="tx2"/>
+              </a:buClr>
+              <a:buFont typeface="Wingdings" panose="05000000000000000000" pitchFamily="2" charset="2"/>
+              <a:buChar char="n"/>
+            </a:pPr>
+            <a:r>
+              <a:rPr lang="zh-CN" altLang="en-US" sz="2200" dirty="0">
+                <a:latin typeface="微软雅黑" panose="020B0503020204020204" pitchFamily="34" charset="-122"/>
+                <a:ea typeface="微软雅黑" panose="020B0503020204020204" pitchFamily="34" charset="-122"/>
+              </a:rPr>
+              <a:t>对于堆区域的对象：</a:t>
+            </a:r>
+            <a:endParaRPr lang="en-US" altLang="zh-CN" sz="2200" dirty="0">
+              <a:latin typeface="微软雅黑" panose="020B0503020204020204" pitchFamily="34" charset="-122"/>
+              <a:ea typeface="微软雅黑" panose="020B0503020204020204" pitchFamily="34" charset="-122"/>
+            </a:endParaRPr>
+          </a:p>
+          <a:p>
+            <a:pPr marL="800100" lvl="1" indent="-342900" algn="just">
+              <a:lnSpc>
+                <a:spcPct val="130000"/>
+              </a:lnSpc>
+              <a:spcBef>
+                <a:spcPts val="600"/>
+              </a:spcBef>
+              <a:spcAft>
+                <a:spcPts val="600"/>
+              </a:spcAft>
+              <a:buClr>
+                <a:schemeClr val="tx2"/>
+              </a:buClr>
+              <a:buFont typeface="Wingdings" panose="05000000000000000000" pitchFamily="2" charset="2"/>
+              <a:buChar char="n"/>
+            </a:pPr>
+            <a:r>
+              <a:rPr lang="zh-CN" altLang="en-US" sz="2200" dirty="0">
+                <a:latin typeface="微软雅黑" panose="020B0503020204020204" pitchFamily="34" charset="-122"/>
+                <a:ea typeface="微软雅黑" panose="020B0503020204020204" pitchFamily="34" charset="-122"/>
+              </a:rPr>
+              <a:t>观察内存分配器的参数</a:t>
+            </a:r>
+            <a:endParaRPr lang="en-US" altLang="zh-CN" sz="2200" dirty="0">
+              <a:latin typeface="微软雅黑" panose="020B0503020204020204" pitchFamily="34" charset="-122"/>
+              <a:ea typeface="微软雅黑" panose="020B0503020204020204" pitchFamily="34" charset="-122"/>
+            </a:endParaRPr>
+          </a:p>
+          <a:p>
+            <a:pPr marL="342900" indent="-342900" algn="just" eaLnBrk="1">
+              <a:lnSpc>
+                <a:spcPct val="130000"/>
+              </a:lnSpc>
+              <a:spcBef>
+                <a:spcPts val="600"/>
+              </a:spcBef>
+              <a:spcAft>
+                <a:spcPts val="600"/>
+              </a:spcAft>
+              <a:buClr>
+                <a:schemeClr val="tx2"/>
+              </a:buClr>
+              <a:buFont typeface="Wingdings" panose="05000000000000000000" pitchFamily="2" charset="2"/>
+              <a:buChar char="n"/>
+            </a:pPr>
+            <a:r>
+              <a:rPr lang="zh-CN" altLang="en-US" sz="2200" dirty="0">
+                <a:latin typeface="微软雅黑" panose="020B0503020204020204" pitchFamily="34" charset="-122"/>
+                <a:ea typeface="微软雅黑" panose="020B0503020204020204" pitchFamily="34" charset="-122"/>
+              </a:rPr>
+              <a:t>对于栈区域</a:t>
+            </a:r>
+            <a:r>
+              <a:rPr lang="zh-CN" altLang="en-CN" sz="2200" dirty="0">
+                <a:latin typeface="微软雅黑" panose="020B0503020204020204" pitchFamily="34" charset="-122"/>
+                <a:ea typeface="微软雅黑" panose="020B0503020204020204" pitchFamily="34" charset="-122"/>
+              </a:rPr>
+              <a:t>和</a:t>
+            </a:r>
+            <a:r>
+              <a:rPr lang="zh-CN" altLang="en-US" sz="2200" dirty="0">
+                <a:latin typeface="微软雅黑" panose="020B0503020204020204" pitchFamily="34" charset="-122"/>
+                <a:ea typeface="微软雅黑" panose="020B0503020204020204" pitchFamily="34" charset="-122"/>
+              </a:rPr>
+              <a:t>全局区域的对象：</a:t>
+            </a:r>
+            <a:endParaRPr lang="en-US" altLang="zh-CN" sz="2200" dirty="0">
+              <a:latin typeface="微软雅黑" panose="020B0503020204020204" pitchFamily="34" charset="-122"/>
+              <a:ea typeface="微软雅黑" panose="020B0503020204020204" pitchFamily="34" charset="-122"/>
+            </a:endParaRPr>
+          </a:p>
+          <a:p>
+            <a:pPr marL="800100" lvl="1" indent="-342900" algn="just">
+              <a:lnSpc>
+                <a:spcPct val="130000"/>
+              </a:lnSpc>
+              <a:spcBef>
+                <a:spcPts val="600"/>
+              </a:spcBef>
+              <a:spcAft>
+                <a:spcPts val="600"/>
+              </a:spcAft>
+              <a:buClr>
+                <a:schemeClr val="tx2"/>
+              </a:buClr>
+              <a:buFont typeface="Wingdings" panose="05000000000000000000" pitchFamily="2" charset="2"/>
+              <a:buChar char="n"/>
+            </a:pPr>
+            <a:r>
+              <a:rPr lang="zh-CN" altLang="en-US" sz="2200" dirty="0">
+                <a:latin typeface="微软雅黑" panose="020B0503020204020204" pitchFamily="34" charset="-122"/>
+                <a:ea typeface="微软雅黑" panose="020B0503020204020204" pitchFamily="34" charset="-122"/>
+              </a:rPr>
+              <a:t>使用过程中的值集分析技术（</a:t>
+            </a:r>
+            <a:r>
+              <a:rPr lang="en-US" altLang="zh-CN" sz="2200" dirty="0" err="1">
+                <a:latin typeface="微软雅黑" panose="020B0503020204020204" pitchFamily="34" charset="-122"/>
+                <a:ea typeface="微软雅黑" panose="020B0503020204020204" pitchFamily="34" charset="-122"/>
+              </a:rPr>
+              <a:t>angr</a:t>
+            </a:r>
+            <a:r>
+              <a:rPr lang="zh-CN" altLang="en-US" sz="2200" dirty="0">
+                <a:latin typeface="微软雅黑" panose="020B0503020204020204" pitchFamily="34" charset="-122"/>
+                <a:ea typeface="微软雅黑" panose="020B0503020204020204" pitchFamily="34" charset="-122"/>
+              </a:rPr>
+              <a:t>）静态地得到对象的边界</a:t>
+            </a:r>
+            <a:endParaRPr lang="en-US" altLang="zh-CN" sz="2200" dirty="0">
+              <a:latin typeface="微软雅黑" panose="020B0503020204020204" pitchFamily="34" charset="-122"/>
+              <a:ea typeface="微软雅黑" panose="020B0503020204020204" pitchFamily="34" charset="-122"/>
+            </a:endParaRPr>
+          </a:p>
+          <a:p>
+            <a:pPr marL="800100" lvl="1" indent="-342900" algn="just">
+              <a:lnSpc>
+                <a:spcPct val="130000"/>
+              </a:lnSpc>
+              <a:spcBef>
+                <a:spcPts val="600"/>
+              </a:spcBef>
+              <a:spcAft>
+                <a:spcPts val="600"/>
+              </a:spcAft>
+              <a:buClr>
+                <a:schemeClr val="tx2"/>
+              </a:buClr>
+              <a:buFont typeface="Wingdings" panose="05000000000000000000" pitchFamily="2" charset="2"/>
+              <a:buChar char="n"/>
+            </a:pPr>
+            <a:r>
+              <a:rPr lang="zh-CN" altLang="en-US" sz="2200" dirty="0">
+                <a:latin typeface="微软雅黑" panose="020B0503020204020204" pitchFamily="34" charset="-122"/>
+                <a:ea typeface="微软雅黑" panose="020B0503020204020204" pitchFamily="34" charset="-122"/>
+              </a:rPr>
+              <a:t>已知的程序属性</a:t>
+            </a:r>
+            <a:endParaRPr lang="en-US" altLang="zh-CN" sz="2200" dirty="0">
+              <a:latin typeface="微软雅黑" panose="020B0503020204020204" pitchFamily="34" charset="-122"/>
+              <a:ea typeface="微软雅黑" panose="020B0503020204020204" pitchFamily="34" charset="-122"/>
+            </a:endParaRPr>
+          </a:p>
+          <a:p>
+            <a:pPr marL="800100" lvl="1" indent="-342900" algn="just">
+              <a:lnSpc>
+                <a:spcPct val="130000"/>
+              </a:lnSpc>
+              <a:spcBef>
+                <a:spcPts val="600"/>
+              </a:spcBef>
+              <a:spcAft>
+                <a:spcPts val="600"/>
+              </a:spcAft>
+              <a:buClr>
+                <a:schemeClr val="tx2"/>
+              </a:buClr>
+              <a:buFont typeface="Wingdings" panose="05000000000000000000" pitchFamily="2" charset="2"/>
+              <a:buChar char="n"/>
+            </a:pPr>
+            <a:r>
+              <a:rPr lang="zh-CN" altLang="en-US" sz="2200" dirty="0">
+                <a:latin typeface="微软雅黑" panose="020B0503020204020204" pitchFamily="34" charset="-122"/>
+                <a:ea typeface="微软雅黑" panose="020B0503020204020204" pitchFamily="34" charset="-122"/>
+              </a:rPr>
+              <a:t>初始化变量表</a:t>
+            </a:r>
+            <a:endParaRPr lang="en-US" altLang="zh-CN" sz="2200" dirty="0">
+              <a:latin typeface="微软雅黑" panose="020B0503020204020204" pitchFamily="34" charset="-122"/>
+              <a:ea typeface="微软雅黑" panose="020B0503020204020204" pitchFamily="34" charset="-122"/>
+            </a:endParaRPr>
+          </a:p>
+          <a:p>
+            <a:pPr marL="800100" lvl="1" indent="-342900" algn="just">
+              <a:lnSpc>
+                <a:spcPct val="130000"/>
+              </a:lnSpc>
+              <a:spcBef>
+                <a:spcPts val="600"/>
+              </a:spcBef>
+              <a:spcAft>
+                <a:spcPts val="600"/>
+              </a:spcAft>
+              <a:buClr>
+                <a:schemeClr val="tx2"/>
+              </a:buClr>
+              <a:buFont typeface="Wingdings" panose="05000000000000000000" pitchFamily="2" charset="2"/>
+              <a:buChar char="n"/>
+            </a:pPr>
+            <a:endParaRPr lang="zh-CN" altLang="en-US" sz="2200" dirty="0">
+              <a:latin typeface="微软雅黑" panose="020B0503020204020204" pitchFamily="34" charset="-122"/>
+              <a:ea typeface="微软雅黑" panose="020B0503020204020204" pitchFamily="34" charset="-122"/>
+            </a:endParaRPr>
+          </a:p>
+        </p:txBody>
+      </p:sp>
+      <p:sp>
+        <p:nvSpPr>
+          <p:cNvPr id="3" name="文本框 2">
+            <a:extLst>
+              <a:ext uri="{FF2B5EF4-FFF2-40B4-BE49-F238E27FC236}">
+                <a16:creationId xmlns:a16="http://schemas.microsoft.com/office/drawing/2014/main" id="{1E06F5D4-1E85-C3CD-588F-2BF038259E0A}"/>
+              </a:ext>
+            </a:extLst>
+          </p:cNvPr>
+          <p:cNvSpPr txBox="1"/>
+          <p:nvPr/>
+        </p:nvSpPr>
+        <p:spPr>
+          <a:xfrm>
+            <a:off x="6096000" y="1832707"/>
+            <a:ext cx="5627878" cy="3899722"/>
+          </a:xfrm>
+          <a:prstGeom prst="rect">
+            <a:avLst/>
+          </a:prstGeom>
+          <a:noFill/>
+        </p:spPr>
+        <p:txBody>
+          <a:bodyPr wrap="square" rtlCol="0">
+            <a:spAutoFit/>
+          </a:bodyPr>
+          <a:lstStyle/>
+          <a:p>
+            <a:pPr marL="342900" indent="-342900" algn="just" eaLnBrk="1">
+              <a:lnSpc>
+                <a:spcPct val="130000"/>
+              </a:lnSpc>
+              <a:spcBef>
+                <a:spcPts val="600"/>
+              </a:spcBef>
+              <a:spcAft>
+                <a:spcPts val="600"/>
+              </a:spcAft>
+              <a:buClr>
+                <a:schemeClr val="tx2"/>
+              </a:buClr>
+              <a:buFont typeface="Wingdings" panose="05000000000000000000" pitchFamily="2" charset="2"/>
+              <a:buChar char="n"/>
+            </a:pPr>
+            <a:r>
+              <a:rPr lang="zh-CN" altLang="en-US" sz="2200" dirty="0">
+                <a:latin typeface="微软雅黑" panose="020B0503020204020204" pitchFamily="34" charset="-122"/>
+                <a:ea typeface="微软雅黑" panose="020B0503020204020204" pitchFamily="34" charset="-122"/>
+              </a:rPr>
+              <a:t>对于堆区域的对象：</a:t>
+            </a:r>
+            <a:endParaRPr lang="en-US" altLang="zh-CN" sz="2200" dirty="0">
+              <a:latin typeface="微软雅黑" panose="020B0503020204020204" pitchFamily="34" charset="-122"/>
+              <a:ea typeface="微软雅黑" panose="020B0503020204020204" pitchFamily="34" charset="-122"/>
+            </a:endParaRPr>
+          </a:p>
+          <a:p>
+            <a:pPr lvl="1" algn="just">
+              <a:lnSpc>
+                <a:spcPct val="130000"/>
+              </a:lnSpc>
+              <a:spcBef>
+                <a:spcPts val="600"/>
+              </a:spcBef>
+              <a:spcAft>
+                <a:spcPts val="600"/>
+              </a:spcAft>
+              <a:buClr>
+                <a:schemeClr val="tx2"/>
+              </a:buClr>
+            </a:pPr>
+            <a:r>
+              <a:rPr lang="zh-CN" altLang="en-US" sz="2200" dirty="0">
+                <a:latin typeface="微软雅黑" panose="020B0503020204020204" pitchFamily="34" charset="-122"/>
+                <a:ea typeface="微软雅黑" panose="020B0503020204020204" pitchFamily="34" charset="-122"/>
+              </a:rPr>
+              <a:t>其生命周期开始于内存分配器分配内存，结束于内存释放</a:t>
+            </a:r>
+            <a:endParaRPr lang="en-US" altLang="zh-CN" sz="2200" dirty="0">
+              <a:latin typeface="微软雅黑" panose="020B0503020204020204" pitchFamily="34" charset="-122"/>
+              <a:ea typeface="微软雅黑" panose="020B0503020204020204" pitchFamily="34" charset="-122"/>
+            </a:endParaRPr>
+          </a:p>
+          <a:p>
+            <a:pPr marL="342900" indent="-342900" algn="just">
+              <a:lnSpc>
+                <a:spcPct val="130000"/>
+              </a:lnSpc>
+              <a:spcBef>
+                <a:spcPts val="600"/>
+              </a:spcBef>
+              <a:spcAft>
+                <a:spcPts val="600"/>
+              </a:spcAft>
+              <a:buClr>
+                <a:schemeClr val="tx2"/>
+              </a:buClr>
+              <a:buFont typeface="Wingdings" panose="05000000000000000000" pitchFamily="2" charset="2"/>
+              <a:buChar char="n"/>
+            </a:pPr>
+            <a:r>
+              <a:rPr lang="zh-CN" altLang="en-US" sz="2200" dirty="0">
+                <a:latin typeface="微软雅黑" panose="020B0503020204020204" pitchFamily="34" charset="-122"/>
+                <a:ea typeface="微软雅黑" panose="020B0503020204020204" pitchFamily="34" charset="-122"/>
+              </a:rPr>
+              <a:t>对于全局区域的对象：</a:t>
+            </a:r>
+            <a:endParaRPr lang="en-US" altLang="zh-CN" sz="2200" dirty="0">
+              <a:latin typeface="微软雅黑" panose="020B0503020204020204" pitchFamily="34" charset="-122"/>
+              <a:ea typeface="微软雅黑" panose="020B0503020204020204" pitchFamily="34" charset="-122"/>
+            </a:endParaRPr>
+          </a:p>
+          <a:p>
+            <a:pPr marL="800100" lvl="1" indent="-342900" algn="just">
+              <a:lnSpc>
+                <a:spcPct val="130000"/>
+              </a:lnSpc>
+              <a:spcBef>
+                <a:spcPts val="600"/>
+              </a:spcBef>
+              <a:spcAft>
+                <a:spcPts val="600"/>
+              </a:spcAft>
+              <a:buClr>
+                <a:schemeClr val="tx2"/>
+              </a:buClr>
+              <a:buFont typeface="Wingdings" panose="05000000000000000000" pitchFamily="2" charset="2"/>
+              <a:buChar char="n"/>
+            </a:pPr>
+            <a:r>
+              <a:rPr lang="zh-CN" altLang="en-US" sz="2200" dirty="0">
+                <a:latin typeface="微软雅黑" panose="020B0503020204020204" pitchFamily="34" charset="-122"/>
+                <a:ea typeface="微软雅黑" panose="020B0503020204020204" pitchFamily="34" charset="-122"/>
+              </a:rPr>
+              <a:t>开始于程序初始化，结束于程序结束</a:t>
+            </a:r>
+            <a:endParaRPr lang="en-US" altLang="zh-CN" sz="2200" dirty="0">
+              <a:latin typeface="微软雅黑" panose="020B0503020204020204" pitchFamily="34" charset="-122"/>
+              <a:ea typeface="微软雅黑" panose="020B0503020204020204" pitchFamily="34" charset="-122"/>
+            </a:endParaRPr>
+          </a:p>
+          <a:p>
+            <a:pPr marL="342900" indent="-342900" algn="just" eaLnBrk="1">
+              <a:lnSpc>
+                <a:spcPct val="130000"/>
+              </a:lnSpc>
+              <a:spcBef>
+                <a:spcPts val="600"/>
+              </a:spcBef>
+              <a:spcAft>
+                <a:spcPts val="600"/>
+              </a:spcAft>
+              <a:buClr>
+                <a:schemeClr val="tx2"/>
+              </a:buClr>
+              <a:buFont typeface="Wingdings" panose="05000000000000000000" pitchFamily="2" charset="2"/>
+              <a:buChar char="n"/>
+            </a:pPr>
+            <a:r>
+              <a:rPr lang="zh-CN" altLang="en-US" sz="2200" dirty="0">
+                <a:latin typeface="微软雅黑" panose="020B0503020204020204" pitchFamily="34" charset="-122"/>
+                <a:ea typeface="微软雅黑" panose="020B0503020204020204" pitchFamily="34" charset="-122"/>
+              </a:rPr>
+              <a:t>对于栈区域的对象：</a:t>
+            </a:r>
+            <a:endParaRPr lang="en-US" altLang="zh-CN" sz="2200" dirty="0">
+              <a:latin typeface="微软雅黑" panose="020B0503020204020204" pitchFamily="34" charset="-122"/>
+              <a:ea typeface="微软雅黑" panose="020B0503020204020204" pitchFamily="34" charset="-122"/>
+            </a:endParaRPr>
+          </a:p>
+          <a:p>
+            <a:pPr marL="800100" lvl="1" indent="-342900" algn="just">
+              <a:lnSpc>
+                <a:spcPct val="130000"/>
+              </a:lnSpc>
+              <a:spcBef>
+                <a:spcPts val="600"/>
+              </a:spcBef>
+              <a:spcAft>
+                <a:spcPts val="600"/>
+              </a:spcAft>
+              <a:buClr>
+                <a:schemeClr val="tx2"/>
+              </a:buClr>
+              <a:buFont typeface="Wingdings" panose="05000000000000000000" pitchFamily="2" charset="2"/>
+              <a:buChar char="n"/>
+            </a:pPr>
+            <a:r>
+              <a:rPr lang="zh-CN" altLang="en-US" sz="2200" dirty="0">
+                <a:latin typeface="微软雅黑" panose="020B0503020204020204" pitchFamily="34" charset="-122"/>
+                <a:ea typeface="微软雅黑" panose="020B0503020204020204" pitchFamily="34" charset="-122"/>
+              </a:rPr>
+              <a:t>开始于</a:t>
+            </a:r>
+            <a:r>
+              <a:rPr lang="zh-CN" altLang="en-CN" sz="2200" dirty="0">
+                <a:latin typeface="微软雅黑" panose="020B0503020204020204" pitchFamily="34" charset="-122"/>
+                <a:ea typeface="微软雅黑" panose="020B0503020204020204" pitchFamily="34" charset="-122"/>
+              </a:rPr>
+              <a:t>栈帧</a:t>
+            </a:r>
+            <a:r>
+              <a:rPr lang="zh-CN" altLang="en-US" sz="2200" dirty="0">
+                <a:latin typeface="微软雅黑" panose="020B0503020204020204" pitchFamily="34" charset="-122"/>
+                <a:ea typeface="微软雅黑" panose="020B0503020204020204" pitchFamily="34" charset="-122"/>
+              </a:rPr>
+              <a:t>分配，结束于栈帧释放</a:t>
+            </a:r>
+          </a:p>
+        </p:txBody>
+      </p:sp>
     </p:spTree>
     <p:extLst>
       <p:ext uri="{BB962C8B-B14F-4D97-AF65-F5344CB8AC3E}">
-        <p14:creationId xmlns:p14="http://schemas.microsoft.com/office/powerpoint/2010/main" val="1325587010"/>
+        <p14:creationId xmlns:p14="http://schemas.microsoft.com/office/powerpoint/2010/main" val="2075950256"/>
       </p:ext>
     </p:extLst>
   </p:cSld>
@@ -30016,6 +31052,386 @@
 </file>
 
 <file path=ppt/slides/slide16.xml><?xml version="1.0" encoding="utf-8"?>
+<p:sld xmlns:a="http://schemas.openxmlformats.org/drawingml/2006/main" xmlns:r="http://schemas.openxmlformats.org/officeDocument/2006/relationships" xmlns:p="http://schemas.openxmlformats.org/presentationml/2006/main">
+  <p:cSld>
+    <p:spTree>
+      <p:nvGrpSpPr>
+        <p:cNvPr id="1" name="">
+          <a:extLst>
+            <a:ext uri="{FF2B5EF4-FFF2-40B4-BE49-F238E27FC236}">
+              <a16:creationId xmlns:a16="http://schemas.microsoft.com/office/drawing/2014/main" id="{6E4D4824-906E-AA6B-C123-30E5E6225D84}"/>
+            </a:ext>
+          </a:extLst>
+        </p:cNvPr>
+        <p:cNvGrpSpPr/>
+        <p:nvPr/>
+      </p:nvGrpSpPr>
+      <p:grpSpPr>
+        <a:xfrm>
+          <a:off x="0" y="0"/>
+          <a:ext cx="0" cy="0"/>
+          <a:chOff x="0" y="0"/>
+          <a:chExt cx="0" cy="0"/>
+        </a:xfrm>
+      </p:grpSpPr>
+      <p:sp>
+        <p:nvSpPr>
+          <p:cNvPr id="9" name="标题 8">
+            <a:extLst>
+              <a:ext uri="{FF2B5EF4-FFF2-40B4-BE49-F238E27FC236}">
+                <a16:creationId xmlns:a16="http://schemas.microsoft.com/office/drawing/2014/main" id="{6746229F-3FF3-E574-1592-8C3BEB368A14}"/>
+              </a:ext>
+            </a:extLst>
+          </p:cNvPr>
+          <p:cNvSpPr>
+            <a:spLocks noGrp="1"/>
+          </p:cNvSpPr>
+          <p:nvPr>
+            <p:ph type="title"/>
+          </p:nvPr>
+        </p:nvSpPr>
+        <p:spPr>
+          <a:xfrm>
+            <a:off x="577850" y="249067"/>
+            <a:ext cx="8643848" cy="480131"/>
+          </a:xfrm>
+        </p:spPr>
+        <p:txBody>
+          <a:bodyPr/>
+          <a:lstStyle/>
+          <a:p>
+            <a:r>
+              <a:rPr lang="zh-CN" altLang="en-US" dirty="0"/>
+              <a:t>渐进式对象恢复</a:t>
+            </a:r>
+            <a:r>
+              <a:rPr lang="en-US" altLang="zh-CN" dirty="0"/>
+              <a:t>——</a:t>
+            </a:r>
+            <a:r>
+              <a:rPr lang="zh-CN" altLang="en-US" dirty="0"/>
+              <a:t>过程中值集分析（</a:t>
+            </a:r>
+            <a:r>
+              <a:rPr lang="en-US" altLang="zh-CN" dirty="0"/>
+              <a:t>VSA</a:t>
+            </a:r>
+            <a:r>
+              <a:rPr lang="zh-CN" altLang="en-US" dirty="0"/>
+              <a:t>）</a:t>
+            </a:r>
+          </a:p>
+        </p:txBody>
+      </p:sp>
+    </p:spTree>
+    <p:extLst>
+      <p:ext uri="{BB962C8B-B14F-4D97-AF65-F5344CB8AC3E}">
+        <p14:creationId xmlns:p14="http://schemas.microsoft.com/office/powerpoint/2010/main" val="3508653056"/>
+      </p:ext>
+    </p:extLst>
+  </p:cSld>
+  <p:clrMapOvr>
+    <a:masterClrMapping/>
+  </p:clrMapOvr>
+  <p:transition spd="med">
+    <p:pull/>
+  </p:transition>
+</p:sld>
+</file>
+
+<file path=ppt/slides/slide17.xml><?xml version="1.0" encoding="utf-8"?>
+<p:sld xmlns:a="http://schemas.openxmlformats.org/drawingml/2006/main" xmlns:r="http://schemas.openxmlformats.org/officeDocument/2006/relationships" xmlns:p="http://schemas.openxmlformats.org/presentationml/2006/main">
+  <p:cSld>
+    <p:spTree>
+      <p:nvGrpSpPr>
+        <p:cNvPr id="1" name="">
+          <a:extLst>
+            <a:ext uri="{FF2B5EF4-FFF2-40B4-BE49-F238E27FC236}">
+              <a16:creationId xmlns:a16="http://schemas.microsoft.com/office/drawing/2014/main" id="{F75DC184-2476-F47A-25D0-5EC8C88E1D6A}"/>
+            </a:ext>
+          </a:extLst>
+        </p:cNvPr>
+        <p:cNvGrpSpPr/>
+        <p:nvPr/>
+      </p:nvGrpSpPr>
+      <p:grpSpPr>
+        <a:xfrm>
+          <a:off x="0" y="0"/>
+          <a:ext cx="0" cy="0"/>
+          <a:chOff x="0" y="0"/>
+          <a:chExt cx="0" cy="0"/>
+        </a:xfrm>
+      </p:grpSpPr>
+      <p:sp>
+        <p:nvSpPr>
+          <p:cNvPr id="9" name="标题 8">
+            <a:extLst>
+              <a:ext uri="{FF2B5EF4-FFF2-40B4-BE49-F238E27FC236}">
+                <a16:creationId xmlns:a16="http://schemas.microsoft.com/office/drawing/2014/main" id="{BAE71338-55FE-024B-DFD9-8AAD70812952}"/>
+              </a:ext>
+            </a:extLst>
+          </p:cNvPr>
+          <p:cNvSpPr>
+            <a:spLocks noGrp="1"/>
+          </p:cNvSpPr>
+          <p:nvPr>
+            <p:ph type="title"/>
+          </p:nvPr>
+        </p:nvSpPr>
+        <p:spPr>
+          <a:xfrm>
+            <a:off x="577850" y="249067"/>
+            <a:ext cx="8643848" cy="480131"/>
+          </a:xfrm>
+        </p:spPr>
+        <p:txBody>
+          <a:bodyPr/>
+          <a:lstStyle/>
+          <a:p>
+            <a:r>
+              <a:rPr lang="zh-CN" altLang="en-US" dirty="0"/>
+              <a:t>渐进式对象恢复</a:t>
+            </a:r>
+          </a:p>
+        </p:txBody>
+      </p:sp>
+      <p:sp>
+        <p:nvSpPr>
+          <p:cNvPr id="4" name="文本框 2">
+            <a:extLst>
+              <a:ext uri="{FF2B5EF4-FFF2-40B4-BE49-F238E27FC236}">
+                <a16:creationId xmlns:a16="http://schemas.microsoft.com/office/drawing/2014/main" id="{1D6BB486-301F-95F9-7CBE-4E63A20479F3}"/>
+              </a:ext>
+            </a:extLst>
+          </p:cNvPr>
+          <p:cNvSpPr txBox="1"/>
+          <p:nvPr/>
+        </p:nvSpPr>
+        <p:spPr>
+          <a:xfrm>
+            <a:off x="1572668" y="1362219"/>
+            <a:ext cx="8643848" cy="3459601"/>
+          </a:xfrm>
+          <a:prstGeom prst="rect">
+            <a:avLst/>
+          </a:prstGeom>
+          <a:noFill/>
+        </p:spPr>
+        <p:txBody>
+          <a:bodyPr wrap="square" rtlCol="0">
+            <a:spAutoFit/>
+          </a:bodyPr>
+          <a:lstStyle/>
+          <a:p>
+            <a:pPr marL="342900" indent="-342900" algn="just" eaLnBrk="1">
+              <a:lnSpc>
+                <a:spcPct val="130000"/>
+              </a:lnSpc>
+              <a:spcBef>
+                <a:spcPts val="600"/>
+              </a:spcBef>
+              <a:spcAft>
+                <a:spcPts val="600"/>
+              </a:spcAft>
+              <a:buClr>
+                <a:schemeClr val="tx2"/>
+              </a:buClr>
+              <a:buFont typeface="Wingdings" panose="05000000000000000000" pitchFamily="2" charset="2"/>
+              <a:buChar char="n"/>
+            </a:pPr>
+            <a:r>
+              <a:rPr lang="zh-CN" altLang="en-US" sz="2200" dirty="0">
+                <a:latin typeface="微软雅黑" panose="020B0503020204020204" pitchFamily="34" charset="-122"/>
+                <a:ea typeface="微软雅黑" panose="020B0503020204020204" pitchFamily="34" charset="-122"/>
+              </a:rPr>
+              <a:t>对象属性：</a:t>
+            </a:r>
+            <a:endParaRPr lang="en-US" altLang="zh-CN" sz="2200" dirty="0">
+              <a:latin typeface="微软雅黑" panose="020B0503020204020204" pitchFamily="34" charset="-122"/>
+              <a:ea typeface="微软雅黑" panose="020B0503020204020204" pitchFamily="34" charset="-122"/>
+            </a:endParaRPr>
+          </a:p>
+          <a:p>
+            <a:pPr marL="800100" lvl="1" indent="-342900" algn="just">
+              <a:lnSpc>
+                <a:spcPct val="130000"/>
+              </a:lnSpc>
+              <a:spcBef>
+                <a:spcPts val="600"/>
+              </a:spcBef>
+              <a:spcAft>
+                <a:spcPts val="600"/>
+              </a:spcAft>
+              <a:buClr>
+                <a:schemeClr val="tx2"/>
+              </a:buClr>
+              <a:buFont typeface="Wingdings" panose="05000000000000000000" pitchFamily="2" charset="2"/>
+              <a:buChar char="n"/>
+            </a:pPr>
+            <a:r>
+              <a:rPr lang="zh-CN" altLang="en-US" sz="2200" dirty="0">
+                <a:latin typeface="微软雅黑" panose="020B0503020204020204" pitchFamily="34" charset="-122"/>
+                <a:ea typeface="微软雅黑" panose="020B0503020204020204" pitchFamily="34" charset="-122"/>
+              </a:rPr>
+              <a:t>确定的对象属性</a:t>
+            </a:r>
+            <a:r>
+              <a:rPr lang="en-US" altLang="zh-CN" sz="2200" dirty="0">
+                <a:latin typeface="微软雅黑" panose="020B0503020204020204" pitchFamily="34" charset="-122"/>
+                <a:ea typeface="微软雅黑" panose="020B0503020204020204" pitchFamily="34" charset="-122"/>
+              </a:rPr>
+              <a:t>-&gt;</a:t>
+            </a:r>
+            <a:r>
+              <a:rPr lang="zh-CN" altLang="en-US" sz="2200" dirty="0">
+                <a:latin typeface="微软雅黑" panose="020B0503020204020204" pitchFamily="34" charset="-122"/>
+                <a:ea typeface="微软雅黑" panose="020B0503020204020204" pitchFamily="34" charset="-122"/>
+              </a:rPr>
+              <a:t>总是正确的：</a:t>
+            </a:r>
+            <a:endParaRPr lang="en-US" altLang="zh-CN" sz="2200" dirty="0">
+              <a:latin typeface="微软雅黑" panose="020B0503020204020204" pitchFamily="34" charset="-122"/>
+              <a:ea typeface="微软雅黑" panose="020B0503020204020204" pitchFamily="34" charset="-122"/>
+            </a:endParaRPr>
+          </a:p>
+          <a:p>
+            <a:pPr lvl="2" algn="just">
+              <a:lnSpc>
+                <a:spcPct val="130000"/>
+              </a:lnSpc>
+              <a:spcBef>
+                <a:spcPts val="600"/>
+              </a:spcBef>
+              <a:spcAft>
+                <a:spcPts val="600"/>
+              </a:spcAft>
+              <a:buClr>
+                <a:schemeClr val="tx2"/>
+              </a:buClr>
+            </a:pPr>
+            <a:r>
+              <a:rPr lang="zh-CN" altLang="en-US" sz="2200" dirty="0">
+                <a:latin typeface="微软雅黑" panose="020B0503020204020204" pitchFamily="34" charset="-122"/>
+                <a:ea typeface="微软雅黑" panose="020B0503020204020204" pitchFamily="34" charset="-122"/>
+              </a:rPr>
+              <a:t>例如，堆对象的边界信息</a:t>
+            </a:r>
+            <a:endParaRPr lang="en-US" altLang="zh-CN" sz="2200" dirty="0">
+              <a:latin typeface="微软雅黑" panose="020B0503020204020204" pitchFamily="34" charset="-122"/>
+              <a:ea typeface="微软雅黑" panose="020B0503020204020204" pitchFamily="34" charset="-122"/>
+            </a:endParaRPr>
+          </a:p>
+          <a:p>
+            <a:pPr marL="800100" lvl="1" indent="-342900" algn="just">
+              <a:lnSpc>
+                <a:spcPct val="130000"/>
+              </a:lnSpc>
+              <a:spcBef>
+                <a:spcPts val="600"/>
+              </a:spcBef>
+              <a:spcAft>
+                <a:spcPts val="600"/>
+              </a:spcAft>
+              <a:buClr>
+                <a:schemeClr val="tx2"/>
+              </a:buClr>
+              <a:buFont typeface="Wingdings" panose="05000000000000000000" pitchFamily="2" charset="2"/>
+              <a:buChar char="n"/>
+            </a:pPr>
+            <a:r>
+              <a:rPr lang="zh-CN" altLang="en-US" sz="2200" dirty="0">
+                <a:latin typeface="微软雅黑" panose="020B0503020204020204" pitchFamily="34" charset="-122"/>
+                <a:ea typeface="微软雅黑" panose="020B0503020204020204" pitchFamily="34" charset="-122"/>
+              </a:rPr>
+              <a:t>推断的对象属性</a:t>
+            </a:r>
+            <a:r>
+              <a:rPr lang="en-US" altLang="zh-CN" sz="2200" dirty="0">
+                <a:latin typeface="微软雅黑" panose="020B0503020204020204" pitchFamily="34" charset="-122"/>
+                <a:ea typeface="微软雅黑" panose="020B0503020204020204" pitchFamily="34" charset="-122"/>
+              </a:rPr>
+              <a:t>-&gt;</a:t>
+            </a:r>
+            <a:r>
+              <a:rPr lang="zh-CN" altLang="en-US" sz="2200" dirty="0">
+                <a:latin typeface="微软雅黑" panose="020B0503020204020204" pitchFamily="34" charset="-122"/>
+                <a:ea typeface="微软雅黑" panose="020B0503020204020204" pitchFamily="34" charset="-122"/>
+              </a:rPr>
+              <a:t>有错误的可能</a:t>
+            </a:r>
+            <a:endParaRPr lang="en-US" altLang="zh-CN" sz="2200" dirty="0">
+              <a:latin typeface="微软雅黑" panose="020B0503020204020204" pitchFamily="34" charset="-122"/>
+              <a:ea typeface="微软雅黑" panose="020B0503020204020204" pitchFamily="34" charset="-122"/>
+            </a:endParaRPr>
+          </a:p>
+          <a:p>
+            <a:pPr lvl="2" algn="just">
+              <a:lnSpc>
+                <a:spcPct val="130000"/>
+              </a:lnSpc>
+              <a:spcBef>
+                <a:spcPts val="600"/>
+              </a:spcBef>
+              <a:spcAft>
+                <a:spcPts val="600"/>
+              </a:spcAft>
+              <a:buClr>
+                <a:schemeClr val="tx2"/>
+              </a:buClr>
+            </a:pPr>
+            <a:r>
+              <a:rPr lang="zh-CN" altLang="en-US" sz="2200" dirty="0">
+                <a:latin typeface="微软雅黑" panose="020B0503020204020204" pitchFamily="34" charset="-122"/>
+                <a:ea typeface="微软雅黑" panose="020B0503020204020204" pitchFamily="34" charset="-122"/>
+              </a:rPr>
+              <a:t>例如，大部分栈对象和全局对象的边界信息</a:t>
+            </a:r>
+            <a:endParaRPr lang="en-US" altLang="zh-CN" sz="2200" dirty="0">
+              <a:latin typeface="微软雅黑" panose="020B0503020204020204" pitchFamily="34" charset="-122"/>
+              <a:ea typeface="微软雅黑" panose="020B0503020204020204" pitchFamily="34" charset="-122"/>
+            </a:endParaRPr>
+          </a:p>
+          <a:p>
+            <a:pPr marL="800100" lvl="1" indent="-342900" algn="just">
+              <a:lnSpc>
+                <a:spcPct val="130000"/>
+              </a:lnSpc>
+              <a:spcBef>
+                <a:spcPts val="600"/>
+              </a:spcBef>
+              <a:spcAft>
+                <a:spcPts val="600"/>
+              </a:spcAft>
+              <a:buClr>
+                <a:schemeClr val="tx2"/>
+              </a:buClr>
+              <a:buFont typeface="Wingdings" panose="05000000000000000000" pitchFamily="2" charset="2"/>
+              <a:buChar char="n"/>
+            </a:pPr>
+            <a:endParaRPr lang="zh-CN" altLang="en-US" sz="2200" dirty="0">
+              <a:latin typeface="微软雅黑" panose="020B0503020204020204" pitchFamily="34" charset="-122"/>
+              <a:ea typeface="微软雅黑" panose="020B0503020204020204" pitchFamily="34" charset="-122"/>
+            </a:endParaRPr>
+          </a:p>
+        </p:txBody>
+      </p:sp>
+    </p:spTree>
+    <p:extLst>
+      <p:ext uri="{BB962C8B-B14F-4D97-AF65-F5344CB8AC3E}">
+        <p14:creationId xmlns:p14="http://schemas.microsoft.com/office/powerpoint/2010/main" val="525748268"/>
+      </p:ext>
+    </p:extLst>
+  </p:cSld>
+  <p:clrMapOvr>
+    <a:masterClrMapping/>
+  </p:clrMapOvr>
+  <p:transition spd="med">
+    <p:pull/>
+  </p:transition>
+</p:sld>
+</file>
+
+<file path=ppt/slides/slide18.xml><?xml version="1.0" encoding="utf-8"?>
 <p:sld xmlns:a="http://schemas.openxmlformats.org/drawingml/2006/main" xmlns:r="http://schemas.openxmlformats.org/officeDocument/2006/relationships" xmlns:p="http://schemas.openxmlformats.org/presentationml/2006/main">
   <p:cSld>
     <p:spTree>
@@ -30078,7 +31494,7 @@
 </p:sld>
 </file>
 
-<file path=ppt/slides/slide17.xml><?xml version="1.0" encoding="utf-8"?>
+<file path=ppt/slides/slide19.xml><?xml version="1.0" encoding="utf-8"?>
 <p:sld xmlns:a="http://schemas.openxmlformats.org/drawingml/2006/main" xmlns:r="http://schemas.openxmlformats.org/officeDocument/2006/relationships" xmlns:p="http://schemas.openxmlformats.org/presentationml/2006/main">
   <p:cSld>
     <p:spTree>
@@ -30163,7 +31579,7 @@
 </p:sld>
 </file>
 
-<file path=ppt/slides/slide18.xml><?xml version="1.0" encoding="utf-8"?>
+<file path=ppt/slides/slide2.xml><?xml version="1.0" encoding="utf-8"?>
 <p:sld xmlns:a="http://schemas.openxmlformats.org/drawingml/2006/main" xmlns:r="http://schemas.openxmlformats.org/officeDocument/2006/relationships" xmlns:p="http://schemas.openxmlformats.org/presentationml/2006/main">
   <p:cSld>
     <p:spTree>
@@ -30196,12 +31612,63 @@
           <a:lstStyle/>
           <a:p>
             <a:r>
-              <a:rPr lang="en-US" altLang="zh-CN" dirty="0"/>
-              <a:t>MTE</a:t>
+              <a:rPr lang="zh-CN" altLang="en-US" dirty="0"/>
+              <a:t>一段文字</a:t>
             </a:r>
+          </a:p>
+        </p:txBody>
+      </p:sp>
+    </p:spTree>
+    <p:extLst>
+      <p:ext uri="{BB962C8B-B14F-4D97-AF65-F5344CB8AC3E}">
+        <p14:creationId xmlns:p14="http://schemas.microsoft.com/office/powerpoint/2010/main" val="1835823692"/>
+      </p:ext>
+    </p:extLst>
+  </p:cSld>
+  <p:clrMapOvr>
+    <a:masterClrMapping/>
+  </p:clrMapOvr>
+  <p:transition spd="med">
+    <p:pull/>
+  </p:transition>
+</p:sld>
+</file>
+
+<file path=ppt/slides/slide20.xml><?xml version="1.0" encoding="utf-8"?>
+<p:sld xmlns:a="http://schemas.openxmlformats.org/drawingml/2006/main" xmlns:r="http://schemas.openxmlformats.org/officeDocument/2006/relationships" xmlns:p="http://schemas.openxmlformats.org/presentationml/2006/main">
+  <p:cSld>
+    <p:spTree>
+      <p:nvGrpSpPr>
+        <p:cNvPr id="1" name=""/>
+        <p:cNvGrpSpPr/>
+        <p:nvPr/>
+      </p:nvGrpSpPr>
+      <p:grpSpPr>
+        <a:xfrm>
+          <a:off x="0" y="0"/>
+          <a:ext cx="0" cy="0"/>
+          <a:chOff x="0" y="0"/>
+          <a:chExt cx="0" cy="0"/>
+        </a:xfrm>
+      </p:grpSpPr>
+      <p:sp>
+        <p:nvSpPr>
+          <p:cNvPr id="9" name="标题 8"/>
+          <p:cNvSpPr>
+            <a:spLocks noGrp="1"/>
+          </p:cNvSpPr>
+          <p:nvPr>
+            <p:ph type="title"/>
+          </p:nvPr>
+        </p:nvSpPr>
+        <p:spPr/>
+        <p:txBody>
+          <a:bodyPr/>
+          <a:lstStyle/>
+          <a:p>
             <a:r>
               <a:rPr lang="zh-CN" altLang="en-US" dirty="0"/>
-              <a:t>技术</a:t>
+              <a:t>实现</a:t>
             </a:r>
           </a:p>
         </p:txBody>
@@ -30222,7 +31689,7 @@
 </p:sld>
 </file>
 
-<file path=ppt/slides/slide19.xml><?xml version="1.0" encoding="utf-8"?>
+<file path=ppt/slides/slide21.xml><?xml version="1.0" encoding="utf-8"?>
 <p:sld xmlns:a="http://schemas.openxmlformats.org/drawingml/2006/main" xmlns:r="http://schemas.openxmlformats.org/officeDocument/2006/relationships" xmlns:p="http://schemas.openxmlformats.org/presentationml/2006/main">
   <p:cSld>
     <p:spTree>
@@ -32591,7 +34058,7 @@
 </p:sld>
 </file>
 
-<file path=ppt/slides/slide2.xml><?xml version="1.0" encoding="utf-8"?>
+<file path=ppt/slides/slide22.xml><?xml version="1.0" encoding="utf-8"?>
 <p:sld xmlns:a="http://schemas.openxmlformats.org/drawingml/2006/main" xmlns:r="http://schemas.openxmlformats.org/officeDocument/2006/relationships" xmlns:p="http://schemas.openxmlformats.org/presentationml/2006/main">
   <p:cSld>
     <p:spTree>
@@ -32625,66 +34092,67 @@
           <a:p>
             <a:r>
               <a:rPr lang="zh-CN" altLang="en-US" dirty="0"/>
-              <a:t>一段文字</a:t>
+              <a:t>实验一：</a:t>
             </a:r>
+            <a:r>
+              <a:rPr lang="en-US" altLang="zh-CN" dirty="0"/>
+              <a:t>Juliet</a:t>
+            </a:r>
+            <a:r>
+              <a:rPr lang="zh-CN" altLang="en-US" dirty="0"/>
+              <a:t> </a:t>
+            </a:r>
+            <a:r>
+              <a:rPr lang="en-US" altLang="zh-CN" dirty="0"/>
+              <a:t>Test</a:t>
+            </a:r>
+            <a:r>
+              <a:rPr lang="zh-CN" altLang="en-US" dirty="0"/>
+              <a:t> </a:t>
+            </a:r>
+            <a:r>
+              <a:rPr lang="en-US" altLang="zh-CN" dirty="0"/>
+              <a:t>Suite</a:t>
+            </a:r>
+            <a:endParaRPr lang="zh-CN" altLang="en-US" dirty="0"/>
           </a:p>
         </p:txBody>
       </p:sp>
-    </p:spTree>
-    <p:extLst>
-      <p:ext uri="{BB962C8B-B14F-4D97-AF65-F5344CB8AC3E}">
-        <p14:creationId xmlns:p14="http://schemas.microsoft.com/office/powerpoint/2010/main" val="1835823692"/>
-      </p:ext>
-    </p:extLst>
-  </p:cSld>
-  <p:clrMapOvr>
-    <a:masterClrMapping/>
-  </p:clrMapOvr>
-  <p:transition spd="med">
-    <p:pull/>
-  </p:transition>
-</p:sld>
-</file>
-
-<file path=ppt/slides/slide20.xml><?xml version="1.0" encoding="utf-8"?>
-<p:sld xmlns:a="http://schemas.openxmlformats.org/drawingml/2006/main" xmlns:r="http://schemas.openxmlformats.org/officeDocument/2006/relationships" xmlns:p="http://schemas.openxmlformats.org/presentationml/2006/main">
-  <p:cSld>
-    <p:spTree>
-      <p:nvGrpSpPr>
-        <p:cNvPr id="1" name=""/>
-        <p:cNvGrpSpPr/>
-        <p:nvPr/>
-      </p:nvGrpSpPr>
-      <p:grpSpPr>
-        <a:xfrm>
-          <a:off x="0" y="0"/>
-          <a:ext cx="0" cy="0"/>
-          <a:chOff x="0" y="0"/>
-          <a:chExt cx="0" cy="0"/>
-        </a:xfrm>
-      </p:grpSpPr>
-      <p:sp>
-        <p:nvSpPr>
-          <p:cNvPr id="9" name="标题 8"/>
-          <p:cNvSpPr>
-            <a:spLocks noGrp="1"/>
-          </p:cNvSpPr>
-          <p:nvPr>
-            <p:ph type="title"/>
-          </p:nvPr>
-        </p:nvSpPr>
-        <p:spPr/>
-        <p:txBody>
-          <a:bodyPr/>
-          <a:lstStyle/>
-          <a:p>
-            <a:r>
-              <a:rPr lang="zh-CN" altLang="en-US" dirty="0"/>
-              <a:t>一段文字</a:t>
-            </a:r>
-          </a:p>
-        </p:txBody>
-      </p:sp>
+      <p:pic>
+        <p:nvPicPr>
+          <p:cNvPr id="3" name="Picture 2">
+            <a:extLst>
+              <a:ext uri="{FF2B5EF4-FFF2-40B4-BE49-F238E27FC236}">
+                <a16:creationId xmlns:a16="http://schemas.microsoft.com/office/drawing/2014/main" id="{19F7C2FA-4F29-9146-9B0C-927F56141CA8}"/>
+              </a:ext>
+            </a:extLst>
+          </p:cNvPr>
+          <p:cNvPicPr>
+            <a:picLocks noChangeAspect="1"/>
+          </p:cNvPicPr>
+          <p:nvPr/>
+        </p:nvPicPr>
+        <p:blipFill>
+          <a:blip r:embed="rId3">
+            <a:extLst>
+              <a:ext uri="{28A0092B-C50C-407E-A947-70E740481C1C}">
+                <a14:useLocalDpi xmlns:a14="http://schemas.microsoft.com/office/drawing/2010/main" val="0"/>
+              </a:ext>
+            </a:extLst>
+          </a:blip>
+          <a:srcRect r="406"/>
+          <a:stretch/>
+        </p:blipFill>
+        <p:spPr>
+          <a:xfrm>
+            <a:off x="358061" y="1207008"/>
+            <a:ext cx="11475878" cy="2548128"/>
+          </a:xfrm>
+          <a:prstGeom prst="rect">
+            <a:avLst/>
+          </a:prstGeom>
+        </p:spPr>
+      </p:pic>
     </p:spTree>
     <p:extLst>
       <p:ext uri="{BB962C8B-B14F-4D97-AF65-F5344CB8AC3E}">
@@ -32701,7 +34169,443 @@
 </p:sld>
 </file>
 
-<file path=ppt/slides/slide21.xml><?xml version="1.0" encoding="utf-8"?>
+<file path=ppt/slides/slide23.xml><?xml version="1.0" encoding="utf-8"?>
+<p:sld xmlns:a="http://schemas.openxmlformats.org/drawingml/2006/main" xmlns:r="http://schemas.openxmlformats.org/officeDocument/2006/relationships" xmlns:p="http://schemas.openxmlformats.org/presentationml/2006/main">
+  <p:cSld>
+    <p:spTree>
+      <p:nvGrpSpPr>
+        <p:cNvPr id="1" name="">
+          <a:extLst>
+            <a:ext uri="{FF2B5EF4-FFF2-40B4-BE49-F238E27FC236}">
+              <a16:creationId xmlns:a16="http://schemas.microsoft.com/office/drawing/2014/main" id="{BCC56DF2-94C5-F692-BD34-01B888F74037}"/>
+            </a:ext>
+          </a:extLst>
+        </p:cNvPr>
+        <p:cNvGrpSpPr/>
+        <p:nvPr/>
+      </p:nvGrpSpPr>
+      <p:grpSpPr>
+        <a:xfrm>
+          <a:off x="0" y="0"/>
+          <a:ext cx="0" cy="0"/>
+          <a:chOff x="0" y="0"/>
+          <a:chExt cx="0" cy="0"/>
+        </a:xfrm>
+      </p:grpSpPr>
+      <p:sp>
+        <p:nvSpPr>
+          <p:cNvPr id="9" name="标题 8">
+            <a:extLst>
+              <a:ext uri="{FF2B5EF4-FFF2-40B4-BE49-F238E27FC236}">
+                <a16:creationId xmlns:a16="http://schemas.microsoft.com/office/drawing/2014/main" id="{2CDD31DB-62B0-D547-2349-0B5A49F723E9}"/>
+              </a:ext>
+            </a:extLst>
+          </p:cNvPr>
+          <p:cNvSpPr>
+            <a:spLocks noGrp="1"/>
+          </p:cNvSpPr>
+          <p:nvPr>
+            <p:ph type="title"/>
+          </p:nvPr>
+        </p:nvSpPr>
+        <p:spPr/>
+        <p:txBody>
+          <a:bodyPr/>
+          <a:lstStyle/>
+          <a:p>
+            <a:r>
+              <a:rPr lang="zh-CN" altLang="en-US" dirty="0"/>
+              <a:t>实验一：</a:t>
+            </a:r>
+            <a:r>
+              <a:rPr lang="en-CN" altLang="zh-CN" dirty="0"/>
+              <a:t>Real</a:t>
+            </a:r>
+            <a:r>
+              <a:rPr lang="en-US" altLang="zh-CN" dirty="0"/>
+              <a:t>-world</a:t>
+            </a:r>
+            <a:r>
+              <a:rPr lang="zh-CN" altLang="en-US" dirty="0"/>
+              <a:t> </a:t>
+            </a:r>
+            <a:r>
+              <a:rPr lang="en-US" altLang="zh-CN" dirty="0"/>
+              <a:t>Vulnerabilities</a:t>
+            </a:r>
+            <a:endParaRPr lang="zh-CN" altLang="en-US" dirty="0"/>
+          </a:p>
+        </p:txBody>
+      </p:sp>
+      <p:pic>
+        <p:nvPicPr>
+          <p:cNvPr id="3" name="Picture 2">
+            <a:extLst>
+              <a:ext uri="{FF2B5EF4-FFF2-40B4-BE49-F238E27FC236}">
+                <a16:creationId xmlns:a16="http://schemas.microsoft.com/office/drawing/2014/main" id="{265DB603-3CC3-0D0C-16A7-55F59FE5D860}"/>
+              </a:ext>
+            </a:extLst>
+          </p:cNvPr>
+          <p:cNvPicPr>
+            <a:picLocks noChangeAspect="1"/>
+          </p:cNvPicPr>
+          <p:nvPr/>
+        </p:nvPicPr>
+        <p:blipFill>
+          <a:blip r:embed="rId3">
+            <a:extLst>
+              <a:ext uri="{28A0092B-C50C-407E-A947-70E740481C1C}">
+                <a14:useLocalDpi xmlns:a14="http://schemas.microsoft.com/office/drawing/2010/main" val="0"/>
+              </a:ext>
+            </a:extLst>
+          </a:blip>
+          <a:stretch>
+            <a:fillRect/>
+          </a:stretch>
+        </p:blipFill>
+        <p:spPr>
+          <a:xfrm>
+            <a:off x="190500" y="891031"/>
+            <a:ext cx="6259068" cy="5922559"/>
+          </a:xfrm>
+          <a:prstGeom prst="rect">
+            <a:avLst/>
+          </a:prstGeom>
+        </p:spPr>
+      </p:pic>
+      <p:sp>
+        <p:nvSpPr>
+          <p:cNvPr id="5" name="TextBox 4">
+            <a:extLst>
+              <a:ext uri="{FF2B5EF4-FFF2-40B4-BE49-F238E27FC236}">
+                <a16:creationId xmlns:a16="http://schemas.microsoft.com/office/drawing/2014/main" id="{A8FF1B03-248F-096E-58D5-88D7D9681220}"/>
+              </a:ext>
+            </a:extLst>
+          </p:cNvPr>
+          <p:cNvSpPr txBox="1"/>
+          <p:nvPr/>
+        </p:nvSpPr>
+        <p:spPr>
+          <a:xfrm>
+            <a:off x="6708648" y="1792146"/>
+            <a:ext cx="4837176" cy="3785652"/>
+          </a:xfrm>
+          <a:prstGeom prst="rect">
+            <a:avLst/>
+          </a:prstGeom>
+          <a:noFill/>
+        </p:spPr>
+        <p:txBody>
+          <a:bodyPr wrap="square">
+            <a:spAutoFit/>
+          </a:bodyPr>
+          <a:lstStyle/>
+          <a:p>
+            <a:r>
+              <a:rPr lang="en-US" altLang="zh-CN" sz="2400" dirty="0"/>
+              <a:t>1.</a:t>
+            </a:r>
+            <a:r>
+              <a:rPr lang="en-CN" sz="2400" dirty="0"/>
+              <a:t>MTSan 在检测真实世界中的内存错误方面比现有的二进制sanitizers更有效</a:t>
+            </a:r>
+            <a:r>
+              <a:rPr lang="zh-CN" altLang="en-US" sz="2400" dirty="0"/>
+              <a:t>：</a:t>
+            </a:r>
+            <a:endParaRPr lang="en-US" altLang="zh-CN" sz="2400" dirty="0"/>
+          </a:p>
+          <a:p>
+            <a:r>
+              <a:rPr lang="en-US" sz="2400" dirty="0"/>
+              <a:t>        </a:t>
+            </a:r>
+            <a:r>
+              <a:rPr lang="en-US" sz="2400" dirty="0" err="1"/>
+              <a:t>a.MTSan</a:t>
+            </a:r>
+            <a:r>
+              <a:rPr lang="zh-CN" altLang="en-US" sz="2400" dirty="0"/>
+              <a:t>在</a:t>
+            </a:r>
+            <a:r>
+              <a:rPr lang="en-US" altLang="zh-CN" sz="2400" dirty="0"/>
+              <a:t>18</a:t>
+            </a:r>
+            <a:r>
+              <a:rPr lang="zh-CN" altLang="en-US" sz="2400" dirty="0"/>
+              <a:t>个漏洞的检测中胜于其他最先进的</a:t>
+            </a:r>
+            <a:r>
+              <a:rPr lang="en-US" sz="2400" dirty="0"/>
+              <a:t>sanitizers</a:t>
+            </a:r>
+          </a:p>
+          <a:p>
+            <a:r>
+              <a:rPr lang="en-US" altLang="zh-CN" sz="2400" dirty="0"/>
+              <a:t>        b.</a:t>
+            </a:r>
+            <a:r>
+              <a:rPr lang="zh-CN" altLang="en-US" sz="2400" dirty="0"/>
+              <a:t>对于</a:t>
+            </a:r>
+            <a:r>
+              <a:rPr lang="en-US" sz="2400" dirty="0"/>
+              <a:t>CVE-2017-9047MTSan </a:t>
+            </a:r>
+            <a:r>
+              <a:rPr lang="zh-CN" altLang="en-US" sz="2400" dirty="0"/>
+              <a:t>在 </a:t>
+            </a:r>
+            <a:r>
+              <a:rPr lang="en-US" altLang="zh-CN" sz="2400" dirty="0"/>
+              <a:t>489 </a:t>
+            </a:r>
+            <a:r>
+              <a:rPr lang="zh-CN" altLang="en-US" sz="2400" dirty="0"/>
+              <a:t>个 </a:t>
+            </a:r>
+            <a:r>
+              <a:rPr lang="en-US" sz="2400" dirty="0"/>
+              <a:t>PoC </a:t>
+            </a:r>
+            <a:r>
+              <a:rPr lang="zh-CN" altLang="en-US" sz="2400" dirty="0"/>
+              <a:t>中报告了 </a:t>
+            </a:r>
+            <a:r>
+              <a:rPr lang="en-US" altLang="zh-CN" sz="2400" dirty="0"/>
+              <a:t>40 </a:t>
+            </a:r>
+            <a:r>
+              <a:rPr lang="zh-CN" altLang="en-US" sz="2400" dirty="0"/>
+              <a:t>个 </a:t>
+            </a:r>
+            <a:r>
+              <a:rPr lang="en-US" sz="2400" dirty="0"/>
+              <a:t>PoC </a:t>
+            </a:r>
+            <a:r>
+              <a:rPr lang="zh-CN" altLang="en-US" sz="2400" dirty="0"/>
+              <a:t>为关键漏洞，</a:t>
+            </a:r>
+            <a:r>
+              <a:rPr lang="en-US" altLang="zh-CN" sz="2400" dirty="0"/>
+              <a:t>449 </a:t>
+            </a:r>
+            <a:r>
+              <a:rPr lang="zh-CN" altLang="en-US" sz="2400" dirty="0"/>
+              <a:t>个 </a:t>
+            </a:r>
+            <a:r>
+              <a:rPr lang="en-US" sz="2400" dirty="0"/>
+              <a:t>PoC </a:t>
+            </a:r>
+            <a:r>
+              <a:rPr lang="zh-CN" altLang="en-US" sz="2400" dirty="0"/>
+              <a:t>为非关键漏洞。同时，</a:t>
+            </a:r>
+            <a:r>
+              <a:rPr lang="en-US" sz="2400" dirty="0" err="1"/>
+              <a:t>Valgrind、ASan-Retrowrite</a:t>
+            </a:r>
+            <a:r>
+              <a:rPr lang="en-US" sz="2400" dirty="0"/>
+              <a:t> </a:t>
+            </a:r>
+            <a:r>
+              <a:rPr lang="zh-CN" altLang="en-US" sz="2400" dirty="0"/>
+              <a:t>和 </a:t>
+            </a:r>
+            <a:r>
+              <a:rPr lang="en-US" sz="2400" dirty="0" err="1"/>
+              <a:t>QASan</a:t>
+            </a:r>
+            <a:r>
+              <a:rPr lang="en-US" sz="2400" dirty="0"/>
+              <a:t> </a:t>
+            </a:r>
+            <a:r>
+              <a:rPr lang="zh-CN" altLang="en-US" sz="2400" dirty="0"/>
+              <a:t>未能检测到其中任何一个。</a:t>
+            </a:r>
+            <a:endParaRPr lang="en-CN" sz="2400" dirty="0"/>
+          </a:p>
+        </p:txBody>
+      </p:sp>
+    </p:spTree>
+    <p:extLst>
+      <p:ext uri="{BB962C8B-B14F-4D97-AF65-F5344CB8AC3E}">
+        <p14:creationId xmlns:p14="http://schemas.microsoft.com/office/powerpoint/2010/main" val="2764970182"/>
+      </p:ext>
+    </p:extLst>
+  </p:cSld>
+  <p:clrMapOvr>
+    <a:masterClrMapping/>
+  </p:clrMapOvr>
+  <p:transition spd="med">
+    <p:pull/>
+  </p:transition>
+</p:sld>
+</file>
+
+<file path=ppt/slides/slide24.xml><?xml version="1.0" encoding="utf-8"?>
+<p:sld xmlns:a="http://schemas.openxmlformats.org/drawingml/2006/main" xmlns:r="http://schemas.openxmlformats.org/officeDocument/2006/relationships" xmlns:p="http://schemas.openxmlformats.org/presentationml/2006/main">
+  <p:cSld>
+    <p:spTree>
+      <p:nvGrpSpPr>
+        <p:cNvPr id="1" name="">
+          <a:extLst>
+            <a:ext uri="{FF2B5EF4-FFF2-40B4-BE49-F238E27FC236}">
+              <a16:creationId xmlns:a16="http://schemas.microsoft.com/office/drawing/2014/main" id="{C7BBA5FF-A1A2-46E8-1CEB-BAE443AB06D3}"/>
+            </a:ext>
+          </a:extLst>
+        </p:cNvPr>
+        <p:cNvGrpSpPr/>
+        <p:nvPr/>
+      </p:nvGrpSpPr>
+      <p:grpSpPr>
+        <a:xfrm>
+          <a:off x="0" y="0"/>
+          <a:ext cx="0" cy="0"/>
+          <a:chOff x="0" y="0"/>
+          <a:chExt cx="0" cy="0"/>
+        </a:xfrm>
+      </p:grpSpPr>
+      <p:sp>
+        <p:nvSpPr>
+          <p:cNvPr id="9" name="标题 8">
+            <a:extLst>
+              <a:ext uri="{FF2B5EF4-FFF2-40B4-BE49-F238E27FC236}">
+                <a16:creationId xmlns:a16="http://schemas.microsoft.com/office/drawing/2014/main" id="{6C54C1BD-32B0-21B2-B2CC-0CADE94D9BFC}"/>
+              </a:ext>
+            </a:extLst>
+          </p:cNvPr>
+          <p:cNvSpPr>
+            <a:spLocks noGrp="1"/>
+          </p:cNvSpPr>
+          <p:nvPr>
+            <p:ph type="title"/>
+          </p:nvPr>
+        </p:nvSpPr>
+        <p:spPr/>
+        <p:txBody>
+          <a:bodyPr/>
+          <a:lstStyle/>
+          <a:p>
+            <a:r>
+              <a:rPr lang="zh-CN" altLang="en-US" dirty="0"/>
+              <a:t>实验一：</a:t>
+            </a:r>
+            <a:r>
+              <a:rPr lang="en-CN" altLang="zh-CN" dirty="0"/>
+              <a:t>Real</a:t>
+            </a:r>
+            <a:r>
+              <a:rPr lang="en-US" altLang="zh-CN" dirty="0"/>
+              <a:t>-world</a:t>
+            </a:r>
+            <a:r>
+              <a:rPr lang="zh-CN" altLang="en-US" dirty="0"/>
+              <a:t> </a:t>
+            </a:r>
+            <a:r>
+              <a:rPr lang="en-US" altLang="zh-CN" dirty="0"/>
+              <a:t>Vulnerabilities</a:t>
+            </a:r>
+            <a:endParaRPr lang="zh-CN" altLang="en-US" dirty="0"/>
+          </a:p>
+        </p:txBody>
+      </p:sp>
+      <p:pic>
+        <p:nvPicPr>
+          <p:cNvPr id="4" name="Picture 3">
+            <a:extLst>
+              <a:ext uri="{FF2B5EF4-FFF2-40B4-BE49-F238E27FC236}">
+                <a16:creationId xmlns:a16="http://schemas.microsoft.com/office/drawing/2014/main" id="{771A7342-7B8E-A427-48E7-536650EEE0D0}"/>
+              </a:ext>
+            </a:extLst>
+          </p:cNvPr>
+          <p:cNvPicPr>
+            <a:picLocks noChangeAspect="1"/>
+          </p:cNvPicPr>
+          <p:nvPr/>
+        </p:nvPicPr>
+        <p:blipFill>
+          <a:blip r:embed="rId3">
+            <a:extLst>
+              <a:ext uri="{28A0092B-C50C-407E-A947-70E740481C1C}">
+                <a14:useLocalDpi xmlns:a14="http://schemas.microsoft.com/office/drawing/2010/main" val="0"/>
+              </a:ext>
+            </a:extLst>
+          </a:blip>
+          <a:stretch>
+            <a:fillRect/>
+          </a:stretch>
+        </p:blipFill>
+        <p:spPr>
+          <a:xfrm>
+            <a:off x="743712" y="1521206"/>
+            <a:ext cx="7290816" cy="3815587"/>
+          </a:xfrm>
+          <a:prstGeom prst="rect">
+            <a:avLst/>
+          </a:prstGeom>
+        </p:spPr>
+      </p:pic>
+      <p:sp>
+        <p:nvSpPr>
+          <p:cNvPr id="6" name="TextBox 5">
+            <a:extLst>
+              <a:ext uri="{FF2B5EF4-FFF2-40B4-BE49-F238E27FC236}">
+                <a16:creationId xmlns:a16="http://schemas.microsoft.com/office/drawing/2014/main" id="{3414AAA7-A1DD-59C6-C2B9-2756802E8D49}"/>
+              </a:ext>
+            </a:extLst>
+          </p:cNvPr>
+          <p:cNvSpPr txBox="1"/>
+          <p:nvPr/>
+        </p:nvSpPr>
+        <p:spPr>
+          <a:xfrm>
+            <a:off x="8973312" y="2020240"/>
+            <a:ext cx="1792224" cy="3194304"/>
+          </a:xfrm>
+          <a:prstGeom prst="rect">
+            <a:avLst/>
+          </a:prstGeom>
+          <a:noFill/>
+        </p:spPr>
+        <p:txBody>
+          <a:bodyPr wrap="square">
+            <a:spAutoFit/>
+          </a:bodyPr>
+          <a:lstStyle/>
+          <a:p>
+            <a:r>
+              <a:rPr lang="en-CN" dirty="0"/>
+              <a:t>在 12 个堆漏洞中，MTSan 在 5 个中检测到的 PoC 数量最多，且没有任何误报。Valgrind 和 QASan 在检测堆内存错误方面也取得了很高的成功率，但在某些情况下会失败</a:t>
+            </a:r>
+          </a:p>
+        </p:txBody>
+      </p:sp>
+    </p:spTree>
+    <p:extLst>
+      <p:ext uri="{BB962C8B-B14F-4D97-AF65-F5344CB8AC3E}">
+        <p14:creationId xmlns:p14="http://schemas.microsoft.com/office/powerpoint/2010/main" val="4213795721"/>
+      </p:ext>
+    </p:extLst>
+  </p:cSld>
+  <p:clrMapOvr>
+    <a:masterClrMapping/>
+  </p:clrMapOvr>
+  <p:transition spd="med">
+    <p:pull/>
+  </p:transition>
+</p:sld>
+</file>
+
+<file path=ppt/slides/slide25.xml><?xml version="1.0" encoding="utf-8"?>
 <p:sld xmlns:a="http://schemas.openxmlformats.org/drawingml/2006/main" xmlns:r="http://schemas.openxmlformats.org/officeDocument/2006/relationships" xmlns:p="http://schemas.openxmlformats.org/presentationml/2006/main">
   <p:cSld>
     <p:spTree>
@@ -34569,7 +36473,7 @@
 </p:sld>
 </file>
 
-<file path=ppt/slides/slide22.xml><?xml version="1.0" encoding="utf-8"?>
+<file path=ppt/slides/slide26.xml><?xml version="1.0" encoding="utf-8"?>
 <p:sld xmlns:a="http://schemas.openxmlformats.org/drawingml/2006/main" xmlns:r="http://schemas.openxmlformats.org/officeDocument/2006/relationships" xmlns:p="http://schemas.openxmlformats.org/presentationml/2006/main">
   <p:cSld>
     <p:spTree>
@@ -34628,7 +36532,7 @@
 </p:sld>
 </file>
 
-<file path=ppt/slides/slide23.xml><?xml version="1.0" encoding="utf-8"?>
+<file path=ppt/slides/slide27.xml><?xml version="1.0" encoding="utf-8"?>
 <p:sld xmlns:a="http://schemas.openxmlformats.org/drawingml/2006/main" xmlns:r="http://schemas.openxmlformats.org/officeDocument/2006/relationships" xmlns:p="http://schemas.openxmlformats.org/presentationml/2006/main">
   <p:cSld>
     <p:spTree>
@@ -34687,7 +36591,7 @@
 </p:sld>
 </file>
 
-<file path=ppt/slides/slide24.xml><?xml version="1.0" encoding="utf-8"?>
+<file path=ppt/slides/slide28.xml><?xml version="1.0" encoding="utf-8"?>
 <p:sld xmlns:a="http://schemas.openxmlformats.org/drawingml/2006/main" xmlns:r="http://schemas.openxmlformats.org/officeDocument/2006/relationships" xmlns:p="http://schemas.openxmlformats.org/presentationml/2006/main">
   <p:cSld>
     <p:spTree>
@@ -34746,7 +36650,7 @@
 </p:sld>
 </file>
 
-<file path=ppt/slides/slide25.xml><?xml version="1.0" encoding="utf-8"?>
+<file path=ppt/slides/slide29.xml><?xml version="1.0" encoding="utf-8"?>
 <p:sld xmlns:a="http://schemas.openxmlformats.org/drawingml/2006/main" xmlns:r="http://schemas.openxmlformats.org/officeDocument/2006/relationships" xmlns:p="http://schemas.openxmlformats.org/presentationml/2006/main">
   <p:cSld>
     <p:spTree>
@@ -35107,7 +37011,7 @@
                   <a:spcPct val="110000"/>
                 </a:lnSpc>
               </a:pPr>
-              <a:t>2024/10/10</a:t>
+              <a:t>2024/10/11</a:t>
             </a:fld>
             <a:endParaRPr lang="zh-CN" altLang="en-US" dirty="0">
               <a:latin typeface="微软雅黑" panose="020B0503020204020204" pitchFamily="34" charset="-122"/>

</xml_diff>